<commit_message>
added method for square
</commit_message>
<xml_diff>
--- a/CGP Presentation.pptx
+++ b/CGP Presentation.pptx
@@ -9,6 +9,7 @@
     <p:sldId id="256" r:id="rId4"/>
     <p:sldId id="257" r:id="rId5"/>
     <p:sldId id="258" r:id="rId6"/>
+    <p:sldId id="259" r:id="rId7"/>
   </p:sldIdLst>
   <p:sldSz cx="10080625" cy="7559675"/>
   <p:notesSz cx="7772400" cy="10058400"/>
@@ -56,7 +57,7 @@
       </p:grpSpPr>
       <p:sp>
         <p:nvSpPr>
-          <p:cNvPr id="27" name="PlaceHolder 1"/>
+          <p:cNvPr id="24" name="PlaceHolder 1"/>
           <p:cNvSpPr>
             <a:spLocks noGrp="1"/>
           </p:cNvSpPr>
@@ -67,7 +68,7 @@
         <p:spPr>
           <a:xfrm>
             <a:off x="504000" y="805320"/>
-            <a:ext cx="9071640" cy="1262160"/>
+            <a:ext cx="9071280" cy="1261800"/>
           </a:xfrm>
           <a:prstGeom prst="rect">
             <a:avLst/>
@@ -76,18 +77,16 @@
         <p:txBody>
           <a:bodyPr lIns="0" rIns="0" tIns="0" bIns="0" anchor="ctr"/>
           <a:p>
-            <a:endParaRPr b="1" lang="en-US" sz="3200" spc="-1" strike="noStrike">
-              <a:solidFill>
-                <a:srgbClr val="000000"/>
-              </a:solidFill>
-              <a:latin typeface="Source Sans Pro Black"/>
-            </a:endParaRPr>
-          </a:p>
-        </p:txBody>
-      </p:sp>
-      <p:sp>
-        <p:nvSpPr>
-          <p:cNvPr id="28" name="PlaceHolder 2"/>
+            <a:pPr algn="ctr"/>
+            <a:endParaRPr b="0" lang="en-PH" sz="4400" spc="-1" strike="noStrike">
+              <a:latin typeface="Arial"/>
+            </a:endParaRPr>
+          </a:p>
+        </p:txBody>
+      </p:sp>
+      <p:sp>
+        <p:nvSpPr>
+          <p:cNvPr id="25" name="PlaceHolder 2"/>
           <p:cNvSpPr>
             <a:spLocks noGrp="1"/>
           </p:cNvSpPr>
@@ -98,27 +97,26 @@
         <p:spPr>
           <a:xfrm>
             <a:off x="504000" y="2273040"/>
-            <a:ext cx="9071640" cy="2091240"/>
-          </a:xfrm>
-          <a:prstGeom prst="rect">
-            <a:avLst/>
-          </a:prstGeom>
-        </p:spPr>
-        <p:txBody>
-          <a:bodyPr lIns="0" rIns="0" tIns="0" bIns="0"/>
-          <a:p>
-            <a:endParaRPr b="1" lang="en-US" sz="2200" spc="-1" strike="noStrike">
-              <a:solidFill>
-                <a:srgbClr val="000000"/>
-              </a:solidFill>
-              <a:latin typeface="Source Sans Pro Black"/>
-            </a:endParaRPr>
-          </a:p>
-        </p:txBody>
-      </p:sp>
-      <p:sp>
-        <p:nvSpPr>
-          <p:cNvPr id="29" name="PlaceHolder 3"/>
+            <a:ext cx="9071280" cy="2091240"/>
+          </a:xfrm>
+          <a:prstGeom prst="rect">
+            <a:avLst/>
+          </a:prstGeom>
+        </p:spPr>
+        <p:txBody>
+          <a:bodyPr lIns="0" rIns="0" tIns="0" bIns="0">
+            <a:normAutofit/>
+          </a:bodyPr>
+          <a:p>
+            <a:endParaRPr b="0" lang="en-PH" sz="3200" spc="-1" strike="noStrike">
+              <a:latin typeface="Arial"/>
+            </a:endParaRPr>
+          </a:p>
+        </p:txBody>
+      </p:sp>
+      <p:sp>
+        <p:nvSpPr>
+          <p:cNvPr id="26" name="PlaceHolder 3"/>
           <p:cNvSpPr>
             <a:spLocks noGrp="1"/>
           </p:cNvSpPr>
@@ -129,20 +127,19 @@
         <p:spPr>
           <a:xfrm>
             <a:off x="504000" y="4563360"/>
-            <a:ext cx="9071640" cy="2091240"/>
-          </a:xfrm>
-          <a:prstGeom prst="rect">
-            <a:avLst/>
-          </a:prstGeom>
-        </p:spPr>
-        <p:txBody>
-          <a:bodyPr lIns="0" rIns="0" tIns="0" bIns="0"/>
-          <a:p>
-            <a:endParaRPr b="1" lang="en-US" sz="2200" spc="-1" strike="noStrike">
-              <a:solidFill>
-                <a:srgbClr val="000000"/>
-              </a:solidFill>
-              <a:latin typeface="Source Sans Pro Black"/>
+            <a:ext cx="9071280" cy="2091240"/>
+          </a:xfrm>
+          <a:prstGeom prst="rect">
+            <a:avLst/>
+          </a:prstGeom>
+        </p:spPr>
+        <p:txBody>
+          <a:bodyPr lIns="0" rIns="0" tIns="0" bIns="0">
+            <a:normAutofit/>
+          </a:bodyPr>
+          <a:p>
+            <a:endParaRPr b="0" lang="en-PH" sz="3200" spc="-1" strike="noStrike">
+              <a:latin typeface="Arial"/>
             </a:endParaRPr>
           </a:p>
         </p:txBody>
@@ -171,7 +168,7 @@
       </p:grpSpPr>
       <p:sp>
         <p:nvSpPr>
-          <p:cNvPr id="30" name="PlaceHolder 1"/>
+          <p:cNvPr id="27" name="PlaceHolder 1"/>
           <p:cNvSpPr>
             <a:spLocks noGrp="1"/>
           </p:cNvSpPr>
@@ -182,7 +179,7 @@
         <p:spPr>
           <a:xfrm>
             <a:off x="504000" y="805320"/>
-            <a:ext cx="9071640" cy="1262160"/>
+            <a:ext cx="9071280" cy="1261800"/>
           </a:xfrm>
           <a:prstGeom prst="rect">
             <a:avLst/>
@@ -191,18 +188,16 @@
         <p:txBody>
           <a:bodyPr lIns="0" rIns="0" tIns="0" bIns="0" anchor="ctr"/>
           <a:p>
-            <a:endParaRPr b="1" lang="en-US" sz="3200" spc="-1" strike="noStrike">
-              <a:solidFill>
-                <a:srgbClr val="000000"/>
-              </a:solidFill>
-              <a:latin typeface="Source Sans Pro Black"/>
-            </a:endParaRPr>
-          </a:p>
-        </p:txBody>
-      </p:sp>
-      <p:sp>
-        <p:nvSpPr>
-          <p:cNvPr id="31" name="PlaceHolder 2"/>
+            <a:pPr algn="ctr"/>
+            <a:endParaRPr b="0" lang="en-PH" sz="4400" spc="-1" strike="noStrike">
+              <a:latin typeface="Arial"/>
+            </a:endParaRPr>
+          </a:p>
+        </p:txBody>
+      </p:sp>
+      <p:sp>
+        <p:nvSpPr>
+          <p:cNvPr id="28" name="PlaceHolder 2"/>
           <p:cNvSpPr>
             <a:spLocks noGrp="1"/>
           </p:cNvSpPr>
@@ -213,58 +208,56 @@
         <p:spPr>
           <a:xfrm>
             <a:off x="504000" y="2273040"/>
-            <a:ext cx="4426920" cy="2091240"/>
-          </a:xfrm>
-          <a:prstGeom prst="rect">
-            <a:avLst/>
-          </a:prstGeom>
-        </p:spPr>
-        <p:txBody>
-          <a:bodyPr lIns="0" rIns="0" tIns="0" bIns="0"/>
-          <a:p>
-            <a:endParaRPr b="1" lang="en-US" sz="2200" spc="-1" strike="noStrike">
-              <a:solidFill>
-                <a:srgbClr val="000000"/>
-              </a:solidFill>
-              <a:latin typeface="Source Sans Pro Black"/>
-            </a:endParaRPr>
-          </a:p>
-        </p:txBody>
-      </p:sp>
-      <p:sp>
-        <p:nvSpPr>
-          <p:cNvPr id="32" name="PlaceHolder 3"/>
-          <p:cNvSpPr>
-            <a:spLocks noGrp="1"/>
-          </p:cNvSpPr>
-          <p:nvPr>
-            <p:ph type="body"/>
-          </p:nvPr>
-        </p:nvSpPr>
-        <p:spPr>
-          <a:xfrm>
-            <a:off x="5152680" y="2273040"/>
-            <a:ext cx="4426920" cy="2091240"/>
-          </a:xfrm>
-          <a:prstGeom prst="rect">
-            <a:avLst/>
-          </a:prstGeom>
-        </p:spPr>
-        <p:txBody>
-          <a:bodyPr lIns="0" rIns="0" tIns="0" bIns="0"/>
-          <a:p>
-            <a:endParaRPr b="1" lang="en-US" sz="2200" spc="-1" strike="noStrike">
-              <a:solidFill>
-                <a:srgbClr val="000000"/>
-              </a:solidFill>
-              <a:latin typeface="Source Sans Pro Black"/>
-            </a:endParaRPr>
-          </a:p>
-        </p:txBody>
-      </p:sp>
-      <p:sp>
-        <p:nvSpPr>
-          <p:cNvPr id="33" name="PlaceHolder 4"/>
+            <a:ext cx="4426560" cy="2091240"/>
+          </a:xfrm>
+          <a:prstGeom prst="rect">
+            <a:avLst/>
+          </a:prstGeom>
+        </p:spPr>
+        <p:txBody>
+          <a:bodyPr lIns="0" rIns="0" tIns="0" bIns="0">
+            <a:normAutofit/>
+          </a:bodyPr>
+          <a:p>
+            <a:endParaRPr b="0" lang="en-PH" sz="3200" spc="-1" strike="noStrike">
+              <a:latin typeface="Arial"/>
+            </a:endParaRPr>
+          </a:p>
+        </p:txBody>
+      </p:sp>
+      <p:sp>
+        <p:nvSpPr>
+          <p:cNvPr id="29" name="PlaceHolder 3"/>
+          <p:cNvSpPr>
+            <a:spLocks noGrp="1"/>
+          </p:cNvSpPr>
+          <p:nvPr>
+            <p:ph type="body"/>
+          </p:nvPr>
+        </p:nvSpPr>
+        <p:spPr>
+          <a:xfrm>
+            <a:off x="5152320" y="2273040"/>
+            <a:ext cx="4426560" cy="2091240"/>
+          </a:xfrm>
+          <a:prstGeom prst="rect">
+            <a:avLst/>
+          </a:prstGeom>
+        </p:spPr>
+        <p:txBody>
+          <a:bodyPr lIns="0" rIns="0" tIns="0" bIns="0">
+            <a:normAutofit/>
+          </a:bodyPr>
+          <a:p>
+            <a:endParaRPr b="0" lang="en-PH" sz="3200" spc="-1" strike="noStrike">
+              <a:latin typeface="Arial"/>
+            </a:endParaRPr>
+          </a:p>
+        </p:txBody>
+      </p:sp>
+      <p:sp>
+        <p:nvSpPr>
+          <p:cNvPr id="30" name="PlaceHolder 4"/>
           <p:cNvSpPr>
             <a:spLocks noGrp="1"/>
           </p:cNvSpPr>
@@ -275,51 +268,49 @@
         <p:spPr>
           <a:xfrm>
             <a:off x="504000" y="4563360"/>
-            <a:ext cx="4426920" cy="2091240"/>
-          </a:xfrm>
-          <a:prstGeom prst="rect">
-            <a:avLst/>
-          </a:prstGeom>
-        </p:spPr>
-        <p:txBody>
-          <a:bodyPr lIns="0" rIns="0" tIns="0" bIns="0"/>
-          <a:p>
-            <a:endParaRPr b="1" lang="en-US" sz="2200" spc="-1" strike="noStrike">
-              <a:solidFill>
-                <a:srgbClr val="000000"/>
-              </a:solidFill>
-              <a:latin typeface="Source Sans Pro Black"/>
-            </a:endParaRPr>
-          </a:p>
-        </p:txBody>
-      </p:sp>
-      <p:sp>
-        <p:nvSpPr>
-          <p:cNvPr id="34" name="PlaceHolder 5"/>
-          <p:cNvSpPr>
-            <a:spLocks noGrp="1"/>
-          </p:cNvSpPr>
-          <p:nvPr>
-            <p:ph type="body"/>
-          </p:nvPr>
-        </p:nvSpPr>
-        <p:spPr>
-          <a:xfrm>
-            <a:off x="5152680" y="4563360"/>
-            <a:ext cx="4426920" cy="2091240"/>
-          </a:xfrm>
-          <a:prstGeom prst="rect">
-            <a:avLst/>
-          </a:prstGeom>
-        </p:spPr>
-        <p:txBody>
-          <a:bodyPr lIns="0" rIns="0" tIns="0" bIns="0"/>
-          <a:p>
-            <a:endParaRPr b="1" lang="en-US" sz="2200" spc="-1" strike="noStrike">
-              <a:solidFill>
-                <a:srgbClr val="000000"/>
-              </a:solidFill>
-              <a:latin typeface="Source Sans Pro Black"/>
+            <a:ext cx="4426560" cy="2091240"/>
+          </a:xfrm>
+          <a:prstGeom prst="rect">
+            <a:avLst/>
+          </a:prstGeom>
+        </p:spPr>
+        <p:txBody>
+          <a:bodyPr lIns="0" rIns="0" tIns="0" bIns="0">
+            <a:normAutofit/>
+          </a:bodyPr>
+          <a:p>
+            <a:endParaRPr b="0" lang="en-PH" sz="3200" spc="-1" strike="noStrike">
+              <a:latin typeface="Arial"/>
+            </a:endParaRPr>
+          </a:p>
+        </p:txBody>
+      </p:sp>
+      <p:sp>
+        <p:nvSpPr>
+          <p:cNvPr id="31" name="PlaceHolder 5"/>
+          <p:cNvSpPr>
+            <a:spLocks noGrp="1"/>
+          </p:cNvSpPr>
+          <p:nvPr>
+            <p:ph type="body"/>
+          </p:nvPr>
+        </p:nvSpPr>
+        <p:spPr>
+          <a:xfrm>
+            <a:off x="5152320" y="4563360"/>
+            <a:ext cx="4426560" cy="2091240"/>
+          </a:xfrm>
+          <a:prstGeom prst="rect">
+            <a:avLst/>
+          </a:prstGeom>
+        </p:spPr>
+        <p:txBody>
+          <a:bodyPr lIns="0" rIns="0" tIns="0" bIns="0">
+            <a:normAutofit/>
+          </a:bodyPr>
+          <a:p>
+            <a:endParaRPr b="0" lang="en-PH" sz="3200" spc="-1" strike="noStrike">
+              <a:latin typeface="Arial"/>
             </a:endParaRPr>
           </a:p>
         </p:txBody>
@@ -348,7 +339,7 @@
       </p:grpSpPr>
       <p:sp>
         <p:nvSpPr>
-          <p:cNvPr id="35" name="PlaceHolder 1"/>
+          <p:cNvPr id="32" name="PlaceHolder 1"/>
           <p:cNvSpPr>
             <a:spLocks noGrp="1"/>
           </p:cNvSpPr>
@@ -359,7 +350,7 @@
         <p:spPr>
           <a:xfrm>
             <a:off x="504000" y="805320"/>
-            <a:ext cx="9071640" cy="1262160"/>
+            <a:ext cx="9071280" cy="1261800"/>
           </a:xfrm>
           <a:prstGeom prst="rect">
             <a:avLst/>
@@ -368,18 +359,16 @@
         <p:txBody>
           <a:bodyPr lIns="0" rIns="0" tIns="0" bIns="0" anchor="ctr"/>
           <a:p>
-            <a:endParaRPr b="1" lang="en-US" sz="3200" spc="-1" strike="noStrike">
-              <a:solidFill>
-                <a:srgbClr val="000000"/>
-              </a:solidFill>
-              <a:latin typeface="Source Sans Pro Black"/>
-            </a:endParaRPr>
-          </a:p>
-        </p:txBody>
-      </p:sp>
-      <p:sp>
-        <p:nvSpPr>
-          <p:cNvPr id="36" name="PlaceHolder 2"/>
+            <a:pPr algn="ctr"/>
+            <a:endParaRPr b="0" lang="en-PH" sz="4400" spc="-1" strike="noStrike">
+              <a:latin typeface="Arial"/>
+            </a:endParaRPr>
+          </a:p>
+        </p:txBody>
+      </p:sp>
+      <p:sp>
+        <p:nvSpPr>
+          <p:cNvPr id="33" name="PlaceHolder 2"/>
           <p:cNvSpPr>
             <a:spLocks noGrp="1"/>
           </p:cNvSpPr>
@@ -397,20 +386,19 @@
           </a:prstGeom>
         </p:spPr>
         <p:txBody>
-          <a:bodyPr lIns="0" rIns="0" tIns="0" bIns="0"/>
-          <a:p>
-            <a:endParaRPr b="1" lang="en-US" sz="2200" spc="-1" strike="noStrike">
-              <a:solidFill>
-                <a:srgbClr val="000000"/>
-              </a:solidFill>
-              <a:latin typeface="Source Sans Pro Black"/>
-            </a:endParaRPr>
-          </a:p>
-        </p:txBody>
-      </p:sp>
-      <p:sp>
-        <p:nvSpPr>
-          <p:cNvPr id="37" name="PlaceHolder 3"/>
+          <a:bodyPr lIns="0" rIns="0" tIns="0" bIns="0">
+            <a:normAutofit/>
+          </a:bodyPr>
+          <a:p>
+            <a:endParaRPr b="0" lang="en-PH" sz="3200" spc="-1" strike="noStrike">
+              <a:latin typeface="Arial"/>
+            </a:endParaRPr>
+          </a:p>
+        </p:txBody>
+      </p:sp>
+      <p:sp>
+        <p:nvSpPr>
+          <p:cNvPr id="34" name="PlaceHolder 3"/>
           <p:cNvSpPr>
             <a:spLocks noGrp="1"/>
           </p:cNvSpPr>
@@ -428,20 +416,19 @@
           </a:prstGeom>
         </p:spPr>
         <p:txBody>
-          <a:bodyPr lIns="0" rIns="0" tIns="0" bIns="0"/>
-          <a:p>
-            <a:endParaRPr b="1" lang="en-US" sz="2200" spc="-1" strike="noStrike">
-              <a:solidFill>
-                <a:srgbClr val="000000"/>
-              </a:solidFill>
-              <a:latin typeface="Source Sans Pro Black"/>
-            </a:endParaRPr>
-          </a:p>
-        </p:txBody>
-      </p:sp>
-      <p:sp>
-        <p:nvSpPr>
-          <p:cNvPr id="38" name="PlaceHolder 4"/>
+          <a:bodyPr lIns="0" rIns="0" tIns="0" bIns="0">
+            <a:normAutofit/>
+          </a:bodyPr>
+          <a:p>
+            <a:endParaRPr b="0" lang="en-PH" sz="3200" spc="-1" strike="noStrike">
+              <a:latin typeface="Arial"/>
+            </a:endParaRPr>
+          </a:p>
+        </p:txBody>
+      </p:sp>
+      <p:sp>
+        <p:nvSpPr>
+          <p:cNvPr id="35" name="PlaceHolder 4"/>
           <p:cNvSpPr>
             <a:spLocks noGrp="1"/>
           </p:cNvSpPr>
@@ -459,20 +446,19 @@
           </a:prstGeom>
         </p:spPr>
         <p:txBody>
-          <a:bodyPr lIns="0" rIns="0" tIns="0" bIns="0"/>
-          <a:p>
-            <a:endParaRPr b="1" lang="en-US" sz="2200" spc="-1" strike="noStrike">
-              <a:solidFill>
-                <a:srgbClr val="000000"/>
-              </a:solidFill>
-              <a:latin typeface="Source Sans Pro Black"/>
-            </a:endParaRPr>
-          </a:p>
-        </p:txBody>
-      </p:sp>
-      <p:sp>
-        <p:nvSpPr>
-          <p:cNvPr id="39" name="PlaceHolder 5"/>
+          <a:bodyPr lIns="0" rIns="0" tIns="0" bIns="0">
+            <a:normAutofit/>
+          </a:bodyPr>
+          <a:p>
+            <a:endParaRPr b="0" lang="en-PH" sz="3200" spc="-1" strike="noStrike">
+              <a:latin typeface="Arial"/>
+            </a:endParaRPr>
+          </a:p>
+        </p:txBody>
+      </p:sp>
+      <p:sp>
+        <p:nvSpPr>
+          <p:cNvPr id="36" name="PlaceHolder 5"/>
           <p:cNvSpPr>
             <a:spLocks noGrp="1"/>
           </p:cNvSpPr>
@@ -490,20 +476,19 @@
           </a:prstGeom>
         </p:spPr>
         <p:txBody>
-          <a:bodyPr lIns="0" rIns="0" tIns="0" bIns="0"/>
-          <a:p>
-            <a:endParaRPr b="1" lang="en-US" sz="2200" spc="-1" strike="noStrike">
-              <a:solidFill>
-                <a:srgbClr val="000000"/>
-              </a:solidFill>
-              <a:latin typeface="Source Sans Pro Black"/>
-            </a:endParaRPr>
-          </a:p>
-        </p:txBody>
-      </p:sp>
-      <p:sp>
-        <p:nvSpPr>
-          <p:cNvPr id="40" name="PlaceHolder 6"/>
+          <a:bodyPr lIns="0" rIns="0" tIns="0" bIns="0">
+            <a:normAutofit/>
+          </a:bodyPr>
+          <a:p>
+            <a:endParaRPr b="0" lang="en-PH" sz="3200" spc="-1" strike="noStrike">
+              <a:latin typeface="Arial"/>
+            </a:endParaRPr>
+          </a:p>
+        </p:txBody>
+      </p:sp>
+      <p:sp>
+        <p:nvSpPr>
+          <p:cNvPr id="37" name="PlaceHolder 6"/>
           <p:cNvSpPr>
             <a:spLocks noGrp="1"/>
           </p:cNvSpPr>
@@ -521,20 +506,19 @@
           </a:prstGeom>
         </p:spPr>
         <p:txBody>
-          <a:bodyPr lIns="0" rIns="0" tIns="0" bIns="0"/>
-          <a:p>
-            <a:endParaRPr b="1" lang="en-US" sz="2200" spc="-1" strike="noStrike">
-              <a:solidFill>
-                <a:srgbClr val="000000"/>
-              </a:solidFill>
-              <a:latin typeface="Source Sans Pro Black"/>
-            </a:endParaRPr>
-          </a:p>
-        </p:txBody>
-      </p:sp>
-      <p:sp>
-        <p:nvSpPr>
-          <p:cNvPr id="41" name="PlaceHolder 7"/>
+          <a:bodyPr lIns="0" rIns="0" tIns="0" bIns="0">
+            <a:normAutofit/>
+          </a:bodyPr>
+          <a:p>
+            <a:endParaRPr b="0" lang="en-PH" sz="3200" spc="-1" strike="noStrike">
+              <a:latin typeface="Arial"/>
+            </a:endParaRPr>
+          </a:p>
+        </p:txBody>
+      </p:sp>
+      <p:sp>
+        <p:nvSpPr>
+          <p:cNvPr id="38" name="PlaceHolder 7"/>
           <p:cNvSpPr>
             <a:spLocks noGrp="1"/>
           </p:cNvSpPr>
@@ -552,13 +536,12 @@
           </a:prstGeom>
         </p:spPr>
         <p:txBody>
-          <a:bodyPr lIns="0" rIns="0" tIns="0" bIns="0"/>
-          <a:p>
-            <a:endParaRPr b="1" lang="en-US" sz="2200" spc="-1" strike="noStrike">
-              <a:solidFill>
-                <a:srgbClr val="000000"/>
-              </a:solidFill>
-              <a:latin typeface="Source Sans Pro Black"/>
+          <a:bodyPr lIns="0" rIns="0" tIns="0" bIns="0">
+            <a:normAutofit/>
+          </a:bodyPr>
+          <a:p>
+            <a:endParaRPr b="0" lang="en-PH" sz="3200" spc="-1" strike="noStrike">
+              <a:latin typeface="Arial"/>
             </a:endParaRPr>
           </a:p>
         </p:txBody>
@@ -609,7 +592,7 @@
       </p:grpSpPr>
       <p:sp>
         <p:nvSpPr>
-          <p:cNvPr id="48" name="PlaceHolder 1"/>
+          <p:cNvPr id="42" name="PlaceHolder 1"/>
           <p:cNvSpPr>
             <a:spLocks noGrp="1"/>
           </p:cNvSpPr>
@@ -620,7 +603,7 @@
         <p:spPr>
           <a:xfrm>
             <a:off x="504000" y="805320"/>
-            <a:ext cx="9071640" cy="1262160"/>
+            <a:ext cx="9071280" cy="1261800"/>
           </a:xfrm>
           <a:prstGeom prst="rect">
             <a:avLst/>
@@ -629,18 +612,16 @@
         <p:txBody>
           <a:bodyPr lIns="0" rIns="0" tIns="0" bIns="0" anchor="ctr"/>
           <a:p>
-            <a:endParaRPr b="1" lang="en-US" sz="3200" spc="-1" strike="noStrike">
-              <a:solidFill>
-                <a:srgbClr val="000000"/>
-              </a:solidFill>
-              <a:latin typeface="Source Sans Pro Black"/>
-            </a:endParaRPr>
-          </a:p>
-        </p:txBody>
-      </p:sp>
-      <p:sp>
-        <p:nvSpPr>
-          <p:cNvPr id="49" name="PlaceHolder 2"/>
+            <a:pPr algn="ctr"/>
+            <a:endParaRPr b="0" lang="en-PH" sz="4400" spc="-1" strike="noStrike">
+              <a:latin typeface="Arial"/>
+            </a:endParaRPr>
+          </a:p>
+        </p:txBody>
+      </p:sp>
+      <p:sp>
+        <p:nvSpPr>
+          <p:cNvPr id="43" name="PlaceHolder 2"/>
           <p:cNvSpPr>
             <a:spLocks noGrp="1"/>
           </p:cNvSpPr>
@@ -651,7 +632,7 @@
         <p:spPr>
           <a:xfrm>
             <a:off x="504000" y="2273040"/>
-            <a:ext cx="9071640" cy="4384800"/>
+            <a:ext cx="9071280" cy="4384440"/>
           </a:xfrm>
           <a:prstGeom prst="rect">
             <a:avLst/>
@@ -661,8 +642,8 @@
           <a:bodyPr lIns="0" rIns="0" tIns="0" bIns="0" anchor="ctr"/>
           <a:p>
             <a:pPr algn="ctr"/>
-            <a:endParaRPr b="1" lang="en-US" sz="3200" spc="-1" strike="noStrike">
-              <a:latin typeface="Source Sans Pro Black"/>
+            <a:endParaRPr b="0" lang="en-PH" sz="3200" spc="-1" strike="noStrike">
+              <a:latin typeface="Arial"/>
             </a:endParaRPr>
           </a:p>
         </p:txBody>
@@ -691,7 +672,7 @@
       </p:grpSpPr>
       <p:sp>
         <p:nvSpPr>
-          <p:cNvPr id="50" name="PlaceHolder 1"/>
+          <p:cNvPr id="44" name="PlaceHolder 1"/>
           <p:cNvSpPr>
             <a:spLocks noGrp="1"/>
           </p:cNvSpPr>
@@ -702,7 +683,7 @@
         <p:spPr>
           <a:xfrm>
             <a:off x="504000" y="805320"/>
-            <a:ext cx="9071640" cy="1262160"/>
+            <a:ext cx="9071280" cy="1261800"/>
           </a:xfrm>
           <a:prstGeom prst="rect">
             <a:avLst/>
@@ -711,18 +692,16 @@
         <p:txBody>
           <a:bodyPr lIns="0" rIns="0" tIns="0" bIns="0" anchor="ctr"/>
           <a:p>
-            <a:endParaRPr b="1" lang="en-US" sz="3200" spc="-1" strike="noStrike">
-              <a:solidFill>
-                <a:srgbClr val="000000"/>
-              </a:solidFill>
-              <a:latin typeface="Source Sans Pro Black"/>
-            </a:endParaRPr>
-          </a:p>
-        </p:txBody>
-      </p:sp>
-      <p:sp>
-        <p:nvSpPr>
-          <p:cNvPr id="51" name="PlaceHolder 2"/>
+            <a:pPr algn="ctr"/>
+            <a:endParaRPr b="0" lang="en-PH" sz="4400" spc="-1" strike="noStrike">
+              <a:latin typeface="Arial"/>
+            </a:endParaRPr>
+          </a:p>
+        </p:txBody>
+      </p:sp>
+      <p:sp>
+        <p:nvSpPr>
+          <p:cNvPr id="45" name="PlaceHolder 2"/>
           <p:cNvSpPr>
             <a:spLocks noGrp="1"/>
           </p:cNvSpPr>
@@ -733,20 +712,19 @@
         <p:spPr>
           <a:xfrm>
             <a:off x="504000" y="2273040"/>
-            <a:ext cx="9071640" cy="4384800"/>
-          </a:xfrm>
-          <a:prstGeom prst="rect">
-            <a:avLst/>
-          </a:prstGeom>
-        </p:spPr>
-        <p:txBody>
-          <a:bodyPr lIns="0" rIns="0" tIns="0" bIns="0"/>
-          <a:p>
-            <a:endParaRPr b="1" lang="en-US" sz="2200" spc="-1" strike="noStrike">
-              <a:solidFill>
-                <a:srgbClr val="000000"/>
-              </a:solidFill>
-              <a:latin typeface="Source Sans Pro Black"/>
+            <a:ext cx="9071280" cy="4384440"/>
+          </a:xfrm>
+          <a:prstGeom prst="rect">
+            <a:avLst/>
+          </a:prstGeom>
+        </p:spPr>
+        <p:txBody>
+          <a:bodyPr lIns="0" rIns="0" tIns="0" bIns="0">
+            <a:normAutofit/>
+          </a:bodyPr>
+          <a:p>
+            <a:endParaRPr b="0" lang="en-PH" sz="3200" spc="-1" strike="noStrike">
+              <a:latin typeface="Arial"/>
             </a:endParaRPr>
           </a:p>
         </p:txBody>
@@ -775,7 +753,7 @@
       </p:grpSpPr>
       <p:sp>
         <p:nvSpPr>
-          <p:cNvPr id="52" name="PlaceHolder 1"/>
+          <p:cNvPr id="46" name="PlaceHolder 1"/>
           <p:cNvSpPr>
             <a:spLocks noGrp="1"/>
           </p:cNvSpPr>
@@ -786,7 +764,7 @@
         <p:spPr>
           <a:xfrm>
             <a:off x="504000" y="805320"/>
-            <a:ext cx="9071640" cy="1262160"/>
+            <a:ext cx="9071280" cy="1261800"/>
           </a:xfrm>
           <a:prstGeom prst="rect">
             <a:avLst/>
@@ -795,18 +773,16 @@
         <p:txBody>
           <a:bodyPr lIns="0" rIns="0" tIns="0" bIns="0" anchor="ctr"/>
           <a:p>
-            <a:endParaRPr b="1" lang="en-US" sz="3200" spc="-1" strike="noStrike">
-              <a:solidFill>
-                <a:srgbClr val="000000"/>
-              </a:solidFill>
-              <a:latin typeface="Source Sans Pro Black"/>
-            </a:endParaRPr>
-          </a:p>
-        </p:txBody>
-      </p:sp>
-      <p:sp>
-        <p:nvSpPr>
-          <p:cNvPr id="53" name="PlaceHolder 2"/>
+            <a:pPr algn="ctr"/>
+            <a:endParaRPr b="0" lang="en-PH" sz="4400" spc="-1" strike="noStrike">
+              <a:latin typeface="Arial"/>
+            </a:endParaRPr>
+          </a:p>
+        </p:txBody>
+      </p:sp>
+      <p:sp>
+        <p:nvSpPr>
+          <p:cNvPr id="47" name="PlaceHolder 2"/>
           <p:cNvSpPr>
             <a:spLocks noGrp="1"/>
           </p:cNvSpPr>
@@ -817,51 +793,49 @@
         <p:spPr>
           <a:xfrm>
             <a:off x="504000" y="2273040"/>
-            <a:ext cx="4426920" cy="4384800"/>
-          </a:xfrm>
-          <a:prstGeom prst="rect">
-            <a:avLst/>
-          </a:prstGeom>
-        </p:spPr>
-        <p:txBody>
-          <a:bodyPr lIns="0" rIns="0" tIns="0" bIns="0"/>
-          <a:p>
-            <a:endParaRPr b="1" lang="en-US" sz="2200" spc="-1" strike="noStrike">
-              <a:solidFill>
-                <a:srgbClr val="000000"/>
-              </a:solidFill>
-              <a:latin typeface="Source Sans Pro Black"/>
-            </a:endParaRPr>
-          </a:p>
-        </p:txBody>
-      </p:sp>
-      <p:sp>
-        <p:nvSpPr>
-          <p:cNvPr id="54" name="PlaceHolder 3"/>
-          <p:cNvSpPr>
-            <a:spLocks noGrp="1"/>
-          </p:cNvSpPr>
-          <p:nvPr>
-            <p:ph type="body"/>
-          </p:nvPr>
-        </p:nvSpPr>
-        <p:spPr>
-          <a:xfrm>
-            <a:off x="5152680" y="2273040"/>
-            <a:ext cx="4426920" cy="4384800"/>
-          </a:xfrm>
-          <a:prstGeom prst="rect">
-            <a:avLst/>
-          </a:prstGeom>
-        </p:spPr>
-        <p:txBody>
-          <a:bodyPr lIns="0" rIns="0" tIns="0" bIns="0"/>
-          <a:p>
-            <a:endParaRPr b="1" lang="en-US" sz="2200" spc="-1" strike="noStrike">
-              <a:solidFill>
-                <a:srgbClr val="000000"/>
-              </a:solidFill>
-              <a:latin typeface="Source Sans Pro Black"/>
+            <a:ext cx="4426560" cy="4384440"/>
+          </a:xfrm>
+          <a:prstGeom prst="rect">
+            <a:avLst/>
+          </a:prstGeom>
+        </p:spPr>
+        <p:txBody>
+          <a:bodyPr lIns="0" rIns="0" tIns="0" bIns="0">
+            <a:normAutofit/>
+          </a:bodyPr>
+          <a:p>
+            <a:endParaRPr b="0" lang="en-PH" sz="3200" spc="-1" strike="noStrike">
+              <a:latin typeface="Arial"/>
+            </a:endParaRPr>
+          </a:p>
+        </p:txBody>
+      </p:sp>
+      <p:sp>
+        <p:nvSpPr>
+          <p:cNvPr id="48" name="PlaceHolder 3"/>
+          <p:cNvSpPr>
+            <a:spLocks noGrp="1"/>
+          </p:cNvSpPr>
+          <p:nvPr>
+            <p:ph type="body"/>
+          </p:nvPr>
+        </p:nvSpPr>
+        <p:spPr>
+          <a:xfrm>
+            <a:off x="5152320" y="2273040"/>
+            <a:ext cx="4426560" cy="4384440"/>
+          </a:xfrm>
+          <a:prstGeom prst="rect">
+            <a:avLst/>
+          </a:prstGeom>
+        </p:spPr>
+        <p:txBody>
+          <a:bodyPr lIns="0" rIns="0" tIns="0" bIns="0">
+            <a:normAutofit/>
+          </a:bodyPr>
+          <a:p>
+            <a:endParaRPr b="0" lang="en-PH" sz="3200" spc="-1" strike="noStrike">
+              <a:latin typeface="Arial"/>
             </a:endParaRPr>
           </a:p>
         </p:txBody>
@@ -890,7 +864,7 @@
       </p:grpSpPr>
       <p:sp>
         <p:nvSpPr>
-          <p:cNvPr id="55" name="PlaceHolder 1"/>
+          <p:cNvPr id="49" name="PlaceHolder 1"/>
           <p:cNvSpPr>
             <a:spLocks noGrp="1"/>
           </p:cNvSpPr>
@@ -901,7 +875,7 @@
         <p:spPr>
           <a:xfrm>
             <a:off x="504000" y="805320"/>
-            <a:ext cx="9071640" cy="1262160"/>
+            <a:ext cx="9071280" cy="1261800"/>
           </a:xfrm>
           <a:prstGeom prst="rect">
             <a:avLst/>
@@ -910,11 +884,9 @@
         <p:txBody>
           <a:bodyPr lIns="0" rIns="0" tIns="0" bIns="0" anchor="ctr"/>
           <a:p>
-            <a:endParaRPr b="1" lang="en-US" sz="3200" spc="-1" strike="noStrike">
-              <a:solidFill>
-                <a:srgbClr val="000000"/>
-              </a:solidFill>
-              <a:latin typeface="Source Sans Pro Black"/>
+            <a:pPr algn="ctr"/>
+            <a:endParaRPr b="0" lang="en-PH" sz="4400" spc="-1" strike="noStrike">
+              <a:latin typeface="Arial"/>
             </a:endParaRPr>
           </a:p>
         </p:txBody>
@@ -943,7 +915,7 @@
       </p:grpSpPr>
       <p:sp>
         <p:nvSpPr>
-          <p:cNvPr id="56" name="PlaceHolder 1"/>
+          <p:cNvPr id="50" name="PlaceHolder 1"/>
           <p:cNvSpPr>
             <a:spLocks noGrp="1"/>
           </p:cNvSpPr>
@@ -954,7 +926,7 @@
         <p:spPr>
           <a:xfrm>
             <a:off x="504000" y="805320"/>
-            <a:ext cx="9071640" cy="5851800"/>
+            <a:ext cx="9071280" cy="5850360"/>
           </a:xfrm>
           <a:prstGeom prst="rect">
             <a:avLst/>
@@ -964,8 +936,8 @@
           <a:bodyPr lIns="0" rIns="0" tIns="0" bIns="0" anchor="ctr"/>
           <a:p>
             <a:pPr algn="ctr"/>
-            <a:endParaRPr b="1" lang="en-US" sz="3200" spc="-1" strike="noStrike">
-              <a:latin typeface="Source Sans Pro Black"/>
+            <a:endParaRPr b="0" lang="en-PH" sz="3200" spc="-1" strike="noStrike">
+              <a:latin typeface="Arial"/>
             </a:endParaRPr>
           </a:p>
         </p:txBody>
@@ -994,7 +966,7 @@
       </p:grpSpPr>
       <p:sp>
         <p:nvSpPr>
-          <p:cNvPr id="57" name="PlaceHolder 1"/>
+          <p:cNvPr id="51" name="PlaceHolder 1"/>
           <p:cNvSpPr>
             <a:spLocks noGrp="1"/>
           </p:cNvSpPr>
@@ -1005,7 +977,7 @@
         <p:spPr>
           <a:xfrm>
             <a:off x="504000" y="805320"/>
-            <a:ext cx="9071640" cy="1262160"/>
+            <a:ext cx="9071280" cy="1261800"/>
           </a:xfrm>
           <a:prstGeom prst="rect">
             <a:avLst/>
@@ -1014,18 +986,16 @@
         <p:txBody>
           <a:bodyPr lIns="0" rIns="0" tIns="0" bIns="0" anchor="ctr"/>
           <a:p>
-            <a:endParaRPr b="1" lang="en-US" sz="3200" spc="-1" strike="noStrike">
-              <a:solidFill>
-                <a:srgbClr val="000000"/>
-              </a:solidFill>
-              <a:latin typeface="Source Sans Pro Black"/>
-            </a:endParaRPr>
-          </a:p>
-        </p:txBody>
-      </p:sp>
-      <p:sp>
-        <p:nvSpPr>
-          <p:cNvPr id="58" name="PlaceHolder 2"/>
+            <a:pPr algn="ctr"/>
+            <a:endParaRPr b="0" lang="en-PH" sz="4400" spc="-1" strike="noStrike">
+              <a:latin typeface="Arial"/>
+            </a:endParaRPr>
+          </a:p>
+        </p:txBody>
+      </p:sp>
+      <p:sp>
+        <p:nvSpPr>
+          <p:cNvPr id="52" name="PlaceHolder 2"/>
           <p:cNvSpPr>
             <a:spLocks noGrp="1"/>
           </p:cNvSpPr>
@@ -1036,58 +1006,56 @@
         <p:spPr>
           <a:xfrm>
             <a:off x="504000" y="2273040"/>
-            <a:ext cx="4426920" cy="2091240"/>
-          </a:xfrm>
-          <a:prstGeom prst="rect">
-            <a:avLst/>
-          </a:prstGeom>
-        </p:spPr>
-        <p:txBody>
-          <a:bodyPr lIns="0" rIns="0" tIns="0" bIns="0"/>
-          <a:p>
-            <a:endParaRPr b="1" lang="en-US" sz="2200" spc="-1" strike="noStrike">
-              <a:solidFill>
-                <a:srgbClr val="000000"/>
-              </a:solidFill>
-              <a:latin typeface="Source Sans Pro Black"/>
-            </a:endParaRPr>
-          </a:p>
-        </p:txBody>
-      </p:sp>
-      <p:sp>
-        <p:nvSpPr>
-          <p:cNvPr id="59" name="PlaceHolder 3"/>
-          <p:cNvSpPr>
-            <a:spLocks noGrp="1"/>
-          </p:cNvSpPr>
-          <p:nvPr>
-            <p:ph type="body"/>
-          </p:nvPr>
-        </p:nvSpPr>
-        <p:spPr>
-          <a:xfrm>
-            <a:off x="5152680" y="2273040"/>
-            <a:ext cx="4426920" cy="4384800"/>
-          </a:xfrm>
-          <a:prstGeom prst="rect">
-            <a:avLst/>
-          </a:prstGeom>
-        </p:spPr>
-        <p:txBody>
-          <a:bodyPr lIns="0" rIns="0" tIns="0" bIns="0"/>
-          <a:p>
-            <a:endParaRPr b="1" lang="en-US" sz="2200" spc="-1" strike="noStrike">
-              <a:solidFill>
-                <a:srgbClr val="000000"/>
-              </a:solidFill>
-              <a:latin typeface="Source Sans Pro Black"/>
-            </a:endParaRPr>
-          </a:p>
-        </p:txBody>
-      </p:sp>
-      <p:sp>
-        <p:nvSpPr>
-          <p:cNvPr id="60" name="PlaceHolder 4"/>
+            <a:ext cx="4426560" cy="2091240"/>
+          </a:xfrm>
+          <a:prstGeom prst="rect">
+            <a:avLst/>
+          </a:prstGeom>
+        </p:spPr>
+        <p:txBody>
+          <a:bodyPr lIns="0" rIns="0" tIns="0" bIns="0">
+            <a:normAutofit/>
+          </a:bodyPr>
+          <a:p>
+            <a:endParaRPr b="0" lang="en-PH" sz="3200" spc="-1" strike="noStrike">
+              <a:latin typeface="Arial"/>
+            </a:endParaRPr>
+          </a:p>
+        </p:txBody>
+      </p:sp>
+      <p:sp>
+        <p:nvSpPr>
+          <p:cNvPr id="53" name="PlaceHolder 3"/>
+          <p:cNvSpPr>
+            <a:spLocks noGrp="1"/>
+          </p:cNvSpPr>
+          <p:nvPr>
+            <p:ph type="body"/>
+          </p:nvPr>
+        </p:nvSpPr>
+        <p:spPr>
+          <a:xfrm>
+            <a:off x="5152320" y="2273040"/>
+            <a:ext cx="4426560" cy="4384440"/>
+          </a:xfrm>
+          <a:prstGeom prst="rect">
+            <a:avLst/>
+          </a:prstGeom>
+        </p:spPr>
+        <p:txBody>
+          <a:bodyPr lIns="0" rIns="0" tIns="0" bIns="0">
+            <a:normAutofit/>
+          </a:bodyPr>
+          <a:p>
+            <a:endParaRPr b="0" lang="en-PH" sz="3200" spc="-1" strike="noStrike">
+              <a:latin typeface="Arial"/>
+            </a:endParaRPr>
+          </a:p>
+        </p:txBody>
+      </p:sp>
+      <p:sp>
+        <p:nvSpPr>
+          <p:cNvPr id="54" name="PlaceHolder 4"/>
           <p:cNvSpPr>
             <a:spLocks noGrp="1"/>
           </p:cNvSpPr>
@@ -1098,20 +1066,19 @@
         <p:spPr>
           <a:xfrm>
             <a:off x="504000" y="4563360"/>
-            <a:ext cx="4426920" cy="2091240"/>
-          </a:xfrm>
-          <a:prstGeom prst="rect">
-            <a:avLst/>
-          </a:prstGeom>
-        </p:spPr>
-        <p:txBody>
-          <a:bodyPr lIns="0" rIns="0" tIns="0" bIns="0"/>
-          <a:p>
-            <a:endParaRPr b="1" lang="en-US" sz="2200" spc="-1" strike="noStrike">
-              <a:solidFill>
-                <a:srgbClr val="000000"/>
-              </a:solidFill>
-              <a:latin typeface="Source Sans Pro Black"/>
+            <a:ext cx="4426560" cy="2091240"/>
+          </a:xfrm>
+          <a:prstGeom prst="rect">
+            <a:avLst/>
+          </a:prstGeom>
+        </p:spPr>
+        <p:txBody>
+          <a:bodyPr lIns="0" rIns="0" tIns="0" bIns="0">
+            <a:normAutofit/>
+          </a:bodyPr>
+          <a:p>
+            <a:endParaRPr b="0" lang="en-PH" sz="3200" spc="-1" strike="noStrike">
+              <a:latin typeface="Arial"/>
             </a:endParaRPr>
           </a:p>
         </p:txBody>
@@ -1140,7 +1107,7 @@
       </p:grpSpPr>
       <p:sp>
         <p:nvSpPr>
-          <p:cNvPr id="6" name="PlaceHolder 1"/>
+          <p:cNvPr id="3" name="PlaceHolder 1"/>
           <p:cNvSpPr>
             <a:spLocks noGrp="1"/>
           </p:cNvSpPr>
@@ -1151,7 +1118,7 @@
         <p:spPr>
           <a:xfrm>
             <a:off x="504000" y="805320"/>
-            <a:ext cx="9071640" cy="1262160"/>
+            <a:ext cx="9071280" cy="1261800"/>
           </a:xfrm>
           <a:prstGeom prst="rect">
             <a:avLst/>
@@ -1160,18 +1127,16 @@
         <p:txBody>
           <a:bodyPr lIns="0" rIns="0" tIns="0" bIns="0" anchor="ctr"/>
           <a:p>
-            <a:endParaRPr b="1" lang="en-US" sz="3200" spc="-1" strike="noStrike">
-              <a:solidFill>
-                <a:srgbClr val="000000"/>
-              </a:solidFill>
-              <a:latin typeface="Source Sans Pro Black"/>
-            </a:endParaRPr>
-          </a:p>
-        </p:txBody>
-      </p:sp>
-      <p:sp>
-        <p:nvSpPr>
-          <p:cNvPr id="7" name="PlaceHolder 2"/>
+            <a:pPr algn="ctr"/>
+            <a:endParaRPr b="0" lang="en-PH" sz="4400" spc="-1" strike="noStrike">
+              <a:latin typeface="Arial"/>
+            </a:endParaRPr>
+          </a:p>
+        </p:txBody>
+      </p:sp>
+      <p:sp>
+        <p:nvSpPr>
+          <p:cNvPr id="4" name="PlaceHolder 2"/>
           <p:cNvSpPr>
             <a:spLocks noGrp="1"/>
           </p:cNvSpPr>
@@ -1182,7 +1147,7 @@
         <p:spPr>
           <a:xfrm>
             <a:off x="504000" y="2273040"/>
-            <a:ext cx="9071640" cy="4384800"/>
+            <a:ext cx="9071280" cy="4384440"/>
           </a:xfrm>
           <a:prstGeom prst="rect">
             <a:avLst/>
@@ -1192,8 +1157,8 @@
           <a:bodyPr lIns="0" rIns="0" tIns="0" bIns="0" anchor="ctr"/>
           <a:p>
             <a:pPr algn="ctr"/>
-            <a:endParaRPr b="1" lang="en-US" sz="3200" spc="-1" strike="noStrike">
-              <a:latin typeface="Source Sans Pro Black"/>
+            <a:endParaRPr b="0" lang="en-PH" sz="3200" spc="-1" strike="noStrike">
+              <a:latin typeface="Arial"/>
             </a:endParaRPr>
           </a:p>
         </p:txBody>
@@ -1222,7 +1187,7 @@
       </p:grpSpPr>
       <p:sp>
         <p:nvSpPr>
-          <p:cNvPr id="61" name="PlaceHolder 1"/>
+          <p:cNvPr id="55" name="PlaceHolder 1"/>
           <p:cNvSpPr>
             <a:spLocks noGrp="1"/>
           </p:cNvSpPr>
@@ -1233,7 +1198,7 @@
         <p:spPr>
           <a:xfrm>
             <a:off x="504000" y="805320"/>
-            <a:ext cx="9071640" cy="1262160"/>
+            <a:ext cx="9071280" cy="1261800"/>
           </a:xfrm>
           <a:prstGeom prst="rect">
             <a:avLst/>
@@ -1242,18 +1207,16 @@
         <p:txBody>
           <a:bodyPr lIns="0" rIns="0" tIns="0" bIns="0" anchor="ctr"/>
           <a:p>
-            <a:endParaRPr b="1" lang="en-US" sz="3200" spc="-1" strike="noStrike">
-              <a:solidFill>
-                <a:srgbClr val="000000"/>
-              </a:solidFill>
-              <a:latin typeface="Source Sans Pro Black"/>
-            </a:endParaRPr>
-          </a:p>
-        </p:txBody>
-      </p:sp>
-      <p:sp>
-        <p:nvSpPr>
-          <p:cNvPr id="62" name="PlaceHolder 2"/>
+            <a:pPr algn="ctr"/>
+            <a:endParaRPr b="0" lang="en-PH" sz="4400" spc="-1" strike="noStrike">
+              <a:latin typeface="Arial"/>
+            </a:endParaRPr>
+          </a:p>
+        </p:txBody>
+      </p:sp>
+      <p:sp>
+        <p:nvSpPr>
+          <p:cNvPr id="56" name="PlaceHolder 2"/>
           <p:cNvSpPr>
             <a:spLocks noGrp="1"/>
           </p:cNvSpPr>
@@ -1264,82 +1227,79 @@
         <p:spPr>
           <a:xfrm>
             <a:off x="504000" y="2273040"/>
-            <a:ext cx="4426920" cy="4384800"/>
-          </a:xfrm>
-          <a:prstGeom prst="rect">
-            <a:avLst/>
-          </a:prstGeom>
-        </p:spPr>
-        <p:txBody>
-          <a:bodyPr lIns="0" rIns="0" tIns="0" bIns="0"/>
-          <a:p>
-            <a:endParaRPr b="1" lang="en-US" sz="2200" spc="-1" strike="noStrike">
-              <a:solidFill>
-                <a:srgbClr val="000000"/>
-              </a:solidFill>
-              <a:latin typeface="Source Sans Pro Black"/>
-            </a:endParaRPr>
-          </a:p>
-        </p:txBody>
-      </p:sp>
-      <p:sp>
-        <p:nvSpPr>
-          <p:cNvPr id="63" name="PlaceHolder 3"/>
-          <p:cNvSpPr>
-            <a:spLocks noGrp="1"/>
-          </p:cNvSpPr>
-          <p:nvPr>
-            <p:ph type="body"/>
-          </p:nvPr>
-        </p:nvSpPr>
-        <p:spPr>
-          <a:xfrm>
-            <a:off x="5152680" y="2273040"/>
-            <a:ext cx="4426920" cy="2091240"/>
-          </a:xfrm>
-          <a:prstGeom prst="rect">
-            <a:avLst/>
-          </a:prstGeom>
-        </p:spPr>
-        <p:txBody>
-          <a:bodyPr lIns="0" rIns="0" tIns="0" bIns="0"/>
-          <a:p>
-            <a:endParaRPr b="1" lang="en-US" sz="2200" spc="-1" strike="noStrike">
-              <a:solidFill>
-                <a:srgbClr val="000000"/>
-              </a:solidFill>
-              <a:latin typeface="Source Sans Pro Black"/>
-            </a:endParaRPr>
-          </a:p>
-        </p:txBody>
-      </p:sp>
-      <p:sp>
-        <p:nvSpPr>
-          <p:cNvPr id="64" name="PlaceHolder 4"/>
-          <p:cNvSpPr>
-            <a:spLocks noGrp="1"/>
-          </p:cNvSpPr>
-          <p:nvPr>
-            <p:ph type="body"/>
-          </p:nvPr>
-        </p:nvSpPr>
-        <p:spPr>
-          <a:xfrm>
-            <a:off x="5152680" y="4563360"/>
-            <a:ext cx="4426920" cy="2091240"/>
-          </a:xfrm>
-          <a:prstGeom prst="rect">
-            <a:avLst/>
-          </a:prstGeom>
-        </p:spPr>
-        <p:txBody>
-          <a:bodyPr lIns="0" rIns="0" tIns="0" bIns="0"/>
-          <a:p>
-            <a:endParaRPr b="1" lang="en-US" sz="2200" spc="-1" strike="noStrike">
-              <a:solidFill>
-                <a:srgbClr val="000000"/>
-              </a:solidFill>
-              <a:latin typeface="Source Sans Pro Black"/>
+            <a:ext cx="4426560" cy="4384440"/>
+          </a:xfrm>
+          <a:prstGeom prst="rect">
+            <a:avLst/>
+          </a:prstGeom>
+        </p:spPr>
+        <p:txBody>
+          <a:bodyPr lIns="0" rIns="0" tIns="0" bIns="0">
+            <a:normAutofit/>
+          </a:bodyPr>
+          <a:p>
+            <a:endParaRPr b="0" lang="en-PH" sz="3200" spc="-1" strike="noStrike">
+              <a:latin typeface="Arial"/>
+            </a:endParaRPr>
+          </a:p>
+        </p:txBody>
+      </p:sp>
+      <p:sp>
+        <p:nvSpPr>
+          <p:cNvPr id="57" name="PlaceHolder 3"/>
+          <p:cNvSpPr>
+            <a:spLocks noGrp="1"/>
+          </p:cNvSpPr>
+          <p:nvPr>
+            <p:ph type="body"/>
+          </p:nvPr>
+        </p:nvSpPr>
+        <p:spPr>
+          <a:xfrm>
+            <a:off x="5152320" y="2273040"/>
+            <a:ext cx="4426560" cy="2091240"/>
+          </a:xfrm>
+          <a:prstGeom prst="rect">
+            <a:avLst/>
+          </a:prstGeom>
+        </p:spPr>
+        <p:txBody>
+          <a:bodyPr lIns="0" rIns="0" tIns="0" bIns="0">
+            <a:normAutofit/>
+          </a:bodyPr>
+          <a:p>
+            <a:endParaRPr b="0" lang="en-PH" sz="3200" spc="-1" strike="noStrike">
+              <a:latin typeface="Arial"/>
+            </a:endParaRPr>
+          </a:p>
+        </p:txBody>
+      </p:sp>
+      <p:sp>
+        <p:nvSpPr>
+          <p:cNvPr id="58" name="PlaceHolder 4"/>
+          <p:cNvSpPr>
+            <a:spLocks noGrp="1"/>
+          </p:cNvSpPr>
+          <p:nvPr>
+            <p:ph type="body"/>
+          </p:nvPr>
+        </p:nvSpPr>
+        <p:spPr>
+          <a:xfrm>
+            <a:off x="5152320" y="4563360"/>
+            <a:ext cx="4426560" cy="2091240"/>
+          </a:xfrm>
+          <a:prstGeom prst="rect">
+            <a:avLst/>
+          </a:prstGeom>
+        </p:spPr>
+        <p:txBody>
+          <a:bodyPr lIns="0" rIns="0" tIns="0" bIns="0">
+            <a:normAutofit/>
+          </a:bodyPr>
+          <a:p>
+            <a:endParaRPr b="0" lang="en-PH" sz="3200" spc="-1" strike="noStrike">
+              <a:latin typeface="Arial"/>
             </a:endParaRPr>
           </a:p>
         </p:txBody>
@@ -1368,7 +1328,7 @@
       </p:grpSpPr>
       <p:sp>
         <p:nvSpPr>
-          <p:cNvPr id="65" name="PlaceHolder 1"/>
+          <p:cNvPr id="59" name="PlaceHolder 1"/>
           <p:cNvSpPr>
             <a:spLocks noGrp="1"/>
           </p:cNvSpPr>
@@ -1379,7 +1339,7 @@
         <p:spPr>
           <a:xfrm>
             <a:off x="504000" y="805320"/>
-            <a:ext cx="9071640" cy="1262160"/>
+            <a:ext cx="9071280" cy="1261800"/>
           </a:xfrm>
           <a:prstGeom prst="rect">
             <a:avLst/>
@@ -1388,18 +1348,16 @@
         <p:txBody>
           <a:bodyPr lIns="0" rIns="0" tIns="0" bIns="0" anchor="ctr"/>
           <a:p>
-            <a:endParaRPr b="1" lang="en-US" sz="3200" spc="-1" strike="noStrike">
-              <a:solidFill>
-                <a:srgbClr val="000000"/>
-              </a:solidFill>
-              <a:latin typeface="Source Sans Pro Black"/>
-            </a:endParaRPr>
-          </a:p>
-        </p:txBody>
-      </p:sp>
-      <p:sp>
-        <p:nvSpPr>
-          <p:cNvPr id="66" name="PlaceHolder 2"/>
+            <a:pPr algn="ctr"/>
+            <a:endParaRPr b="0" lang="en-PH" sz="4400" spc="-1" strike="noStrike">
+              <a:latin typeface="Arial"/>
+            </a:endParaRPr>
+          </a:p>
+        </p:txBody>
+      </p:sp>
+      <p:sp>
+        <p:nvSpPr>
+          <p:cNvPr id="60" name="PlaceHolder 2"/>
           <p:cNvSpPr>
             <a:spLocks noGrp="1"/>
           </p:cNvSpPr>
@@ -1410,58 +1368,56 @@
         <p:spPr>
           <a:xfrm>
             <a:off x="504000" y="2273040"/>
-            <a:ext cx="4426920" cy="2091240"/>
-          </a:xfrm>
-          <a:prstGeom prst="rect">
-            <a:avLst/>
-          </a:prstGeom>
-        </p:spPr>
-        <p:txBody>
-          <a:bodyPr lIns="0" rIns="0" tIns="0" bIns="0"/>
-          <a:p>
-            <a:endParaRPr b="1" lang="en-US" sz="2200" spc="-1" strike="noStrike">
-              <a:solidFill>
-                <a:srgbClr val="000000"/>
-              </a:solidFill>
-              <a:latin typeface="Source Sans Pro Black"/>
-            </a:endParaRPr>
-          </a:p>
-        </p:txBody>
-      </p:sp>
-      <p:sp>
-        <p:nvSpPr>
-          <p:cNvPr id="67" name="PlaceHolder 3"/>
-          <p:cNvSpPr>
-            <a:spLocks noGrp="1"/>
-          </p:cNvSpPr>
-          <p:nvPr>
-            <p:ph type="body"/>
-          </p:nvPr>
-        </p:nvSpPr>
-        <p:spPr>
-          <a:xfrm>
-            <a:off x="5152680" y="2273040"/>
-            <a:ext cx="4426920" cy="2091240"/>
-          </a:xfrm>
-          <a:prstGeom prst="rect">
-            <a:avLst/>
-          </a:prstGeom>
-        </p:spPr>
-        <p:txBody>
-          <a:bodyPr lIns="0" rIns="0" tIns="0" bIns="0"/>
-          <a:p>
-            <a:endParaRPr b="1" lang="en-US" sz="2200" spc="-1" strike="noStrike">
-              <a:solidFill>
-                <a:srgbClr val="000000"/>
-              </a:solidFill>
-              <a:latin typeface="Source Sans Pro Black"/>
-            </a:endParaRPr>
-          </a:p>
-        </p:txBody>
-      </p:sp>
-      <p:sp>
-        <p:nvSpPr>
-          <p:cNvPr id="68" name="PlaceHolder 4"/>
+            <a:ext cx="4426560" cy="2091240"/>
+          </a:xfrm>
+          <a:prstGeom prst="rect">
+            <a:avLst/>
+          </a:prstGeom>
+        </p:spPr>
+        <p:txBody>
+          <a:bodyPr lIns="0" rIns="0" tIns="0" bIns="0">
+            <a:normAutofit/>
+          </a:bodyPr>
+          <a:p>
+            <a:endParaRPr b="0" lang="en-PH" sz="3200" spc="-1" strike="noStrike">
+              <a:latin typeface="Arial"/>
+            </a:endParaRPr>
+          </a:p>
+        </p:txBody>
+      </p:sp>
+      <p:sp>
+        <p:nvSpPr>
+          <p:cNvPr id="61" name="PlaceHolder 3"/>
+          <p:cNvSpPr>
+            <a:spLocks noGrp="1"/>
+          </p:cNvSpPr>
+          <p:nvPr>
+            <p:ph type="body"/>
+          </p:nvPr>
+        </p:nvSpPr>
+        <p:spPr>
+          <a:xfrm>
+            <a:off x="5152320" y="2273040"/>
+            <a:ext cx="4426560" cy="2091240"/>
+          </a:xfrm>
+          <a:prstGeom prst="rect">
+            <a:avLst/>
+          </a:prstGeom>
+        </p:spPr>
+        <p:txBody>
+          <a:bodyPr lIns="0" rIns="0" tIns="0" bIns="0">
+            <a:normAutofit/>
+          </a:bodyPr>
+          <a:p>
+            <a:endParaRPr b="0" lang="en-PH" sz="3200" spc="-1" strike="noStrike">
+              <a:latin typeface="Arial"/>
+            </a:endParaRPr>
+          </a:p>
+        </p:txBody>
+      </p:sp>
+      <p:sp>
+        <p:nvSpPr>
+          <p:cNvPr id="62" name="PlaceHolder 4"/>
           <p:cNvSpPr>
             <a:spLocks noGrp="1"/>
           </p:cNvSpPr>
@@ -1472,20 +1428,19 @@
         <p:spPr>
           <a:xfrm>
             <a:off x="504000" y="4563360"/>
-            <a:ext cx="9071640" cy="2091240"/>
-          </a:xfrm>
-          <a:prstGeom prst="rect">
-            <a:avLst/>
-          </a:prstGeom>
-        </p:spPr>
-        <p:txBody>
-          <a:bodyPr lIns="0" rIns="0" tIns="0" bIns="0"/>
-          <a:p>
-            <a:endParaRPr b="1" lang="en-US" sz="2200" spc="-1" strike="noStrike">
-              <a:solidFill>
-                <a:srgbClr val="000000"/>
-              </a:solidFill>
-              <a:latin typeface="Source Sans Pro Black"/>
+            <a:ext cx="9071280" cy="2091240"/>
+          </a:xfrm>
+          <a:prstGeom prst="rect">
+            <a:avLst/>
+          </a:prstGeom>
+        </p:spPr>
+        <p:txBody>
+          <a:bodyPr lIns="0" rIns="0" tIns="0" bIns="0">
+            <a:normAutofit/>
+          </a:bodyPr>
+          <a:p>
+            <a:endParaRPr b="0" lang="en-PH" sz="3200" spc="-1" strike="noStrike">
+              <a:latin typeface="Arial"/>
             </a:endParaRPr>
           </a:p>
         </p:txBody>
@@ -1514,7 +1469,7 @@
       </p:grpSpPr>
       <p:sp>
         <p:nvSpPr>
-          <p:cNvPr id="69" name="PlaceHolder 1"/>
+          <p:cNvPr id="63" name="PlaceHolder 1"/>
           <p:cNvSpPr>
             <a:spLocks noGrp="1"/>
           </p:cNvSpPr>
@@ -1525,7 +1480,7 @@
         <p:spPr>
           <a:xfrm>
             <a:off x="504000" y="805320"/>
-            <a:ext cx="9071640" cy="1262160"/>
+            <a:ext cx="9071280" cy="1261800"/>
           </a:xfrm>
           <a:prstGeom prst="rect">
             <a:avLst/>
@@ -1534,18 +1489,16 @@
         <p:txBody>
           <a:bodyPr lIns="0" rIns="0" tIns="0" bIns="0" anchor="ctr"/>
           <a:p>
-            <a:endParaRPr b="1" lang="en-US" sz="3200" spc="-1" strike="noStrike">
-              <a:solidFill>
-                <a:srgbClr val="000000"/>
-              </a:solidFill>
-              <a:latin typeface="Source Sans Pro Black"/>
-            </a:endParaRPr>
-          </a:p>
-        </p:txBody>
-      </p:sp>
-      <p:sp>
-        <p:nvSpPr>
-          <p:cNvPr id="70" name="PlaceHolder 2"/>
+            <a:pPr algn="ctr"/>
+            <a:endParaRPr b="0" lang="en-PH" sz="4400" spc="-1" strike="noStrike">
+              <a:latin typeface="Arial"/>
+            </a:endParaRPr>
+          </a:p>
+        </p:txBody>
+      </p:sp>
+      <p:sp>
+        <p:nvSpPr>
+          <p:cNvPr id="64" name="PlaceHolder 2"/>
           <p:cNvSpPr>
             <a:spLocks noGrp="1"/>
           </p:cNvSpPr>
@@ -1556,27 +1509,26 @@
         <p:spPr>
           <a:xfrm>
             <a:off x="504000" y="2273040"/>
-            <a:ext cx="9071640" cy="2091240"/>
-          </a:xfrm>
-          <a:prstGeom prst="rect">
-            <a:avLst/>
-          </a:prstGeom>
-        </p:spPr>
-        <p:txBody>
-          <a:bodyPr lIns="0" rIns="0" tIns="0" bIns="0"/>
-          <a:p>
-            <a:endParaRPr b="1" lang="en-US" sz="2200" spc="-1" strike="noStrike">
-              <a:solidFill>
-                <a:srgbClr val="000000"/>
-              </a:solidFill>
-              <a:latin typeface="Source Sans Pro Black"/>
-            </a:endParaRPr>
-          </a:p>
-        </p:txBody>
-      </p:sp>
-      <p:sp>
-        <p:nvSpPr>
-          <p:cNvPr id="71" name="PlaceHolder 3"/>
+            <a:ext cx="9071280" cy="2091240"/>
+          </a:xfrm>
+          <a:prstGeom prst="rect">
+            <a:avLst/>
+          </a:prstGeom>
+        </p:spPr>
+        <p:txBody>
+          <a:bodyPr lIns="0" rIns="0" tIns="0" bIns="0">
+            <a:normAutofit/>
+          </a:bodyPr>
+          <a:p>
+            <a:endParaRPr b="0" lang="en-PH" sz="3200" spc="-1" strike="noStrike">
+              <a:latin typeface="Arial"/>
+            </a:endParaRPr>
+          </a:p>
+        </p:txBody>
+      </p:sp>
+      <p:sp>
+        <p:nvSpPr>
+          <p:cNvPr id="65" name="PlaceHolder 3"/>
           <p:cNvSpPr>
             <a:spLocks noGrp="1"/>
           </p:cNvSpPr>
@@ -1587,20 +1539,19 @@
         <p:spPr>
           <a:xfrm>
             <a:off x="504000" y="4563360"/>
-            <a:ext cx="9071640" cy="2091240"/>
-          </a:xfrm>
-          <a:prstGeom prst="rect">
-            <a:avLst/>
-          </a:prstGeom>
-        </p:spPr>
-        <p:txBody>
-          <a:bodyPr lIns="0" rIns="0" tIns="0" bIns="0"/>
-          <a:p>
-            <a:endParaRPr b="1" lang="en-US" sz="2200" spc="-1" strike="noStrike">
-              <a:solidFill>
-                <a:srgbClr val="000000"/>
-              </a:solidFill>
-              <a:latin typeface="Source Sans Pro Black"/>
+            <a:ext cx="9071280" cy="2091240"/>
+          </a:xfrm>
+          <a:prstGeom prst="rect">
+            <a:avLst/>
+          </a:prstGeom>
+        </p:spPr>
+        <p:txBody>
+          <a:bodyPr lIns="0" rIns="0" tIns="0" bIns="0">
+            <a:normAutofit/>
+          </a:bodyPr>
+          <a:p>
+            <a:endParaRPr b="0" lang="en-PH" sz="3200" spc="-1" strike="noStrike">
+              <a:latin typeface="Arial"/>
             </a:endParaRPr>
           </a:p>
         </p:txBody>
@@ -1629,7 +1580,7 @@
       </p:grpSpPr>
       <p:sp>
         <p:nvSpPr>
-          <p:cNvPr id="72" name="PlaceHolder 1"/>
+          <p:cNvPr id="66" name="PlaceHolder 1"/>
           <p:cNvSpPr>
             <a:spLocks noGrp="1"/>
           </p:cNvSpPr>
@@ -1640,7 +1591,7 @@
         <p:spPr>
           <a:xfrm>
             <a:off x="504000" y="805320"/>
-            <a:ext cx="9071640" cy="1262160"/>
+            <a:ext cx="9071280" cy="1261800"/>
           </a:xfrm>
           <a:prstGeom prst="rect">
             <a:avLst/>
@@ -1649,18 +1600,16 @@
         <p:txBody>
           <a:bodyPr lIns="0" rIns="0" tIns="0" bIns="0" anchor="ctr"/>
           <a:p>
-            <a:endParaRPr b="1" lang="en-US" sz="3200" spc="-1" strike="noStrike">
-              <a:solidFill>
-                <a:srgbClr val="000000"/>
-              </a:solidFill>
-              <a:latin typeface="Source Sans Pro Black"/>
-            </a:endParaRPr>
-          </a:p>
-        </p:txBody>
-      </p:sp>
-      <p:sp>
-        <p:nvSpPr>
-          <p:cNvPr id="73" name="PlaceHolder 2"/>
+            <a:pPr algn="ctr"/>
+            <a:endParaRPr b="0" lang="en-PH" sz="4400" spc="-1" strike="noStrike">
+              <a:latin typeface="Arial"/>
+            </a:endParaRPr>
+          </a:p>
+        </p:txBody>
+      </p:sp>
+      <p:sp>
+        <p:nvSpPr>
+          <p:cNvPr id="67" name="PlaceHolder 2"/>
           <p:cNvSpPr>
             <a:spLocks noGrp="1"/>
           </p:cNvSpPr>
@@ -1671,58 +1620,56 @@
         <p:spPr>
           <a:xfrm>
             <a:off x="504000" y="2273040"/>
-            <a:ext cx="4426920" cy="2091240"/>
-          </a:xfrm>
-          <a:prstGeom prst="rect">
-            <a:avLst/>
-          </a:prstGeom>
-        </p:spPr>
-        <p:txBody>
-          <a:bodyPr lIns="0" rIns="0" tIns="0" bIns="0"/>
-          <a:p>
-            <a:endParaRPr b="1" lang="en-US" sz="2200" spc="-1" strike="noStrike">
-              <a:solidFill>
-                <a:srgbClr val="000000"/>
-              </a:solidFill>
-              <a:latin typeface="Source Sans Pro Black"/>
-            </a:endParaRPr>
-          </a:p>
-        </p:txBody>
-      </p:sp>
-      <p:sp>
-        <p:nvSpPr>
-          <p:cNvPr id="74" name="PlaceHolder 3"/>
-          <p:cNvSpPr>
-            <a:spLocks noGrp="1"/>
-          </p:cNvSpPr>
-          <p:nvPr>
-            <p:ph type="body"/>
-          </p:nvPr>
-        </p:nvSpPr>
-        <p:spPr>
-          <a:xfrm>
-            <a:off x="5152680" y="2273040"/>
-            <a:ext cx="4426920" cy="2091240"/>
-          </a:xfrm>
-          <a:prstGeom prst="rect">
-            <a:avLst/>
-          </a:prstGeom>
-        </p:spPr>
-        <p:txBody>
-          <a:bodyPr lIns="0" rIns="0" tIns="0" bIns="0"/>
-          <a:p>
-            <a:endParaRPr b="1" lang="en-US" sz="2200" spc="-1" strike="noStrike">
-              <a:solidFill>
-                <a:srgbClr val="000000"/>
-              </a:solidFill>
-              <a:latin typeface="Source Sans Pro Black"/>
-            </a:endParaRPr>
-          </a:p>
-        </p:txBody>
-      </p:sp>
-      <p:sp>
-        <p:nvSpPr>
-          <p:cNvPr id="75" name="PlaceHolder 4"/>
+            <a:ext cx="4426560" cy="2091240"/>
+          </a:xfrm>
+          <a:prstGeom prst="rect">
+            <a:avLst/>
+          </a:prstGeom>
+        </p:spPr>
+        <p:txBody>
+          <a:bodyPr lIns="0" rIns="0" tIns="0" bIns="0">
+            <a:normAutofit/>
+          </a:bodyPr>
+          <a:p>
+            <a:endParaRPr b="0" lang="en-PH" sz="3200" spc="-1" strike="noStrike">
+              <a:latin typeface="Arial"/>
+            </a:endParaRPr>
+          </a:p>
+        </p:txBody>
+      </p:sp>
+      <p:sp>
+        <p:nvSpPr>
+          <p:cNvPr id="68" name="PlaceHolder 3"/>
+          <p:cNvSpPr>
+            <a:spLocks noGrp="1"/>
+          </p:cNvSpPr>
+          <p:nvPr>
+            <p:ph type="body"/>
+          </p:nvPr>
+        </p:nvSpPr>
+        <p:spPr>
+          <a:xfrm>
+            <a:off x="5152320" y="2273040"/>
+            <a:ext cx="4426560" cy="2091240"/>
+          </a:xfrm>
+          <a:prstGeom prst="rect">
+            <a:avLst/>
+          </a:prstGeom>
+        </p:spPr>
+        <p:txBody>
+          <a:bodyPr lIns="0" rIns="0" tIns="0" bIns="0">
+            <a:normAutofit/>
+          </a:bodyPr>
+          <a:p>
+            <a:endParaRPr b="0" lang="en-PH" sz="3200" spc="-1" strike="noStrike">
+              <a:latin typeface="Arial"/>
+            </a:endParaRPr>
+          </a:p>
+        </p:txBody>
+      </p:sp>
+      <p:sp>
+        <p:nvSpPr>
+          <p:cNvPr id="69" name="PlaceHolder 4"/>
           <p:cNvSpPr>
             <a:spLocks noGrp="1"/>
           </p:cNvSpPr>
@@ -1733,51 +1680,49 @@
         <p:spPr>
           <a:xfrm>
             <a:off x="504000" y="4563360"/>
-            <a:ext cx="4426920" cy="2091240"/>
-          </a:xfrm>
-          <a:prstGeom prst="rect">
-            <a:avLst/>
-          </a:prstGeom>
-        </p:spPr>
-        <p:txBody>
-          <a:bodyPr lIns="0" rIns="0" tIns="0" bIns="0"/>
-          <a:p>
-            <a:endParaRPr b="1" lang="en-US" sz="2200" spc="-1" strike="noStrike">
-              <a:solidFill>
-                <a:srgbClr val="000000"/>
-              </a:solidFill>
-              <a:latin typeface="Source Sans Pro Black"/>
-            </a:endParaRPr>
-          </a:p>
-        </p:txBody>
-      </p:sp>
-      <p:sp>
-        <p:nvSpPr>
-          <p:cNvPr id="76" name="PlaceHolder 5"/>
-          <p:cNvSpPr>
-            <a:spLocks noGrp="1"/>
-          </p:cNvSpPr>
-          <p:nvPr>
-            <p:ph type="body"/>
-          </p:nvPr>
-        </p:nvSpPr>
-        <p:spPr>
-          <a:xfrm>
-            <a:off x="5152680" y="4563360"/>
-            <a:ext cx="4426920" cy="2091240"/>
-          </a:xfrm>
-          <a:prstGeom prst="rect">
-            <a:avLst/>
-          </a:prstGeom>
-        </p:spPr>
-        <p:txBody>
-          <a:bodyPr lIns="0" rIns="0" tIns="0" bIns="0"/>
-          <a:p>
-            <a:endParaRPr b="1" lang="en-US" sz="2200" spc="-1" strike="noStrike">
-              <a:solidFill>
-                <a:srgbClr val="000000"/>
-              </a:solidFill>
-              <a:latin typeface="Source Sans Pro Black"/>
+            <a:ext cx="4426560" cy="2091240"/>
+          </a:xfrm>
+          <a:prstGeom prst="rect">
+            <a:avLst/>
+          </a:prstGeom>
+        </p:spPr>
+        <p:txBody>
+          <a:bodyPr lIns="0" rIns="0" tIns="0" bIns="0">
+            <a:normAutofit/>
+          </a:bodyPr>
+          <a:p>
+            <a:endParaRPr b="0" lang="en-PH" sz="3200" spc="-1" strike="noStrike">
+              <a:latin typeface="Arial"/>
+            </a:endParaRPr>
+          </a:p>
+        </p:txBody>
+      </p:sp>
+      <p:sp>
+        <p:nvSpPr>
+          <p:cNvPr id="70" name="PlaceHolder 5"/>
+          <p:cNvSpPr>
+            <a:spLocks noGrp="1"/>
+          </p:cNvSpPr>
+          <p:nvPr>
+            <p:ph type="body"/>
+          </p:nvPr>
+        </p:nvSpPr>
+        <p:spPr>
+          <a:xfrm>
+            <a:off x="5152320" y="4563360"/>
+            <a:ext cx="4426560" cy="2091240"/>
+          </a:xfrm>
+          <a:prstGeom prst="rect">
+            <a:avLst/>
+          </a:prstGeom>
+        </p:spPr>
+        <p:txBody>
+          <a:bodyPr lIns="0" rIns="0" tIns="0" bIns="0">
+            <a:normAutofit/>
+          </a:bodyPr>
+          <a:p>
+            <a:endParaRPr b="0" lang="en-PH" sz="3200" spc="-1" strike="noStrike">
+              <a:latin typeface="Arial"/>
             </a:endParaRPr>
           </a:p>
         </p:txBody>
@@ -1806,7 +1751,7 @@
       </p:grpSpPr>
       <p:sp>
         <p:nvSpPr>
-          <p:cNvPr id="77" name="PlaceHolder 1"/>
+          <p:cNvPr id="71" name="PlaceHolder 1"/>
           <p:cNvSpPr>
             <a:spLocks noGrp="1"/>
           </p:cNvSpPr>
@@ -1817,7 +1762,7 @@
         <p:spPr>
           <a:xfrm>
             <a:off x="504000" y="805320"/>
-            <a:ext cx="9071640" cy="1262160"/>
+            <a:ext cx="9071280" cy="1261800"/>
           </a:xfrm>
           <a:prstGeom prst="rect">
             <a:avLst/>
@@ -1826,18 +1771,16 @@
         <p:txBody>
           <a:bodyPr lIns="0" rIns="0" tIns="0" bIns="0" anchor="ctr"/>
           <a:p>
-            <a:endParaRPr b="1" lang="en-US" sz="3200" spc="-1" strike="noStrike">
-              <a:solidFill>
-                <a:srgbClr val="000000"/>
-              </a:solidFill>
-              <a:latin typeface="Source Sans Pro Black"/>
-            </a:endParaRPr>
-          </a:p>
-        </p:txBody>
-      </p:sp>
-      <p:sp>
-        <p:nvSpPr>
-          <p:cNvPr id="78" name="PlaceHolder 2"/>
+            <a:pPr algn="ctr"/>
+            <a:endParaRPr b="0" lang="en-PH" sz="4400" spc="-1" strike="noStrike">
+              <a:latin typeface="Arial"/>
+            </a:endParaRPr>
+          </a:p>
+        </p:txBody>
+      </p:sp>
+      <p:sp>
+        <p:nvSpPr>
+          <p:cNvPr id="72" name="PlaceHolder 2"/>
           <p:cNvSpPr>
             <a:spLocks noGrp="1"/>
           </p:cNvSpPr>
@@ -1855,20 +1798,19 @@
           </a:prstGeom>
         </p:spPr>
         <p:txBody>
-          <a:bodyPr lIns="0" rIns="0" tIns="0" bIns="0"/>
-          <a:p>
-            <a:endParaRPr b="1" lang="en-US" sz="2200" spc="-1" strike="noStrike">
-              <a:solidFill>
-                <a:srgbClr val="000000"/>
-              </a:solidFill>
-              <a:latin typeface="Source Sans Pro Black"/>
-            </a:endParaRPr>
-          </a:p>
-        </p:txBody>
-      </p:sp>
-      <p:sp>
-        <p:nvSpPr>
-          <p:cNvPr id="79" name="PlaceHolder 3"/>
+          <a:bodyPr lIns="0" rIns="0" tIns="0" bIns="0">
+            <a:normAutofit/>
+          </a:bodyPr>
+          <a:p>
+            <a:endParaRPr b="0" lang="en-PH" sz="3200" spc="-1" strike="noStrike">
+              <a:latin typeface="Arial"/>
+            </a:endParaRPr>
+          </a:p>
+        </p:txBody>
+      </p:sp>
+      <p:sp>
+        <p:nvSpPr>
+          <p:cNvPr id="73" name="PlaceHolder 3"/>
           <p:cNvSpPr>
             <a:spLocks noGrp="1"/>
           </p:cNvSpPr>
@@ -1886,20 +1828,19 @@
           </a:prstGeom>
         </p:spPr>
         <p:txBody>
-          <a:bodyPr lIns="0" rIns="0" tIns="0" bIns="0"/>
-          <a:p>
-            <a:endParaRPr b="1" lang="en-US" sz="2200" spc="-1" strike="noStrike">
-              <a:solidFill>
-                <a:srgbClr val="000000"/>
-              </a:solidFill>
-              <a:latin typeface="Source Sans Pro Black"/>
-            </a:endParaRPr>
-          </a:p>
-        </p:txBody>
-      </p:sp>
-      <p:sp>
-        <p:nvSpPr>
-          <p:cNvPr id="80" name="PlaceHolder 4"/>
+          <a:bodyPr lIns="0" rIns="0" tIns="0" bIns="0">
+            <a:normAutofit/>
+          </a:bodyPr>
+          <a:p>
+            <a:endParaRPr b="0" lang="en-PH" sz="3200" spc="-1" strike="noStrike">
+              <a:latin typeface="Arial"/>
+            </a:endParaRPr>
+          </a:p>
+        </p:txBody>
+      </p:sp>
+      <p:sp>
+        <p:nvSpPr>
+          <p:cNvPr id="74" name="PlaceHolder 4"/>
           <p:cNvSpPr>
             <a:spLocks noGrp="1"/>
           </p:cNvSpPr>
@@ -1917,20 +1858,19 @@
           </a:prstGeom>
         </p:spPr>
         <p:txBody>
-          <a:bodyPr lIns="0" rIns="0" tIns="0" bIns="0"/>
-          <a:p>
-            <a:endParaRPr b="1" lang="en-US" sz="2200" spc="-1" strike="noStrike">
-              <a:solidFill>
-                <a:srgbClr val="000000"/>
-              </a:solidFill>
-              <a:latin typeface="Source Sans Pro Black"/>
-            </a:endParaRPr>
-          </a:p>
-        </p:txBody>
-      </p:sp>
-      <p:sp>
-        <p:nvSpPr>
-          <p:cNvPr id="81" name="PlaceHolder 5"/>
+          <a:bodyPr lIns="0" rIns="0" tIns="0" bIns="0">
+            <a:normAutofit/>
+          </a:bodyPr>
+          <a:p>
+            <a:endParaRPr b="0" lang="en-PH" sz="3200" spc="-1" strike="noStrike">
+              <a:latin typeface="Arial"/>
+            </a:endParaRPr>
+          </a:p>
+        </p:txBody>
+      </p:sp>
+      <p:sp>
+        <p:nvSpPr>
+          <p:cNvPr id="75" name="PlaceHolder 5"/>
           <p:cNvSpPr>
             <a:spLocks noGrp="1"/>
           </p:cNvSpPr>
@@ -1948,20 +1888,19 @@
           </a:prstGeom>
         </p:spPr>
         <p:txBody>
-          <a:bodyPr lIns="0" rIns="0" tIns="0" bIns="0"/>
-          <a:p>
-            <a:endParaRPr b="1" lang="en-US" sz="2200" spc="-1" strike="noStrike">
-              <a:solidFill>
-                <a:srgbClr val="000000"/>
-              </a:solidFill>
-              <a:latin typeface="Source Sans Pro Black"/>
-            </a:endParaRPr>
-          </a:p>
-        </p:txBody>
-      </p:sp>
-      <p:sp>
-        <p:nvSpPr>
-          <p:cNvPr id="82" name="PlaceHolder 6"/>
+          <a:bodyPr lIns="0" rIns="0" tIns="0" bIns="0">
+            <a:normAutofit/>
+          </a:bodyPr>
+          <a:p>
+            <a:endParaRPr b="0" lang="en-PH" sz="3200" spc="-1" strike="noStrike">
+              <a:latin typeface="Arial"/>
+            </a:endParaRPr>
+          </a:p>
+        </p:txBody>
+      </p:sp>
+      <p:sp>
+        <p:nvSpPr>
+          <p:cNvPr id="76" name="PlaceHolder 6"/>
           <p:cNvSpPr>
             <a:spLocks noGrp="1"/>
           </p:cNvSpPr>
@@ -1979,20 +1918,19 @@
           </a:prstGeom>
         </p:spPr>
         <p:txBody>
-          <a:bodyPr lIns="0" rIns="0" tIns="0" bIns="0"/>
-          <a:p>
-            <a:endParaRPr b="1" lang="en-US" sz="2200" spc="-1" strike="noStrike">
-              <a:solidFill>
-                <a:srgbClr val="000000"/>
-              </a:solidFill>
-              <a:latin typeface="Source Sans Pro Black"/>
-            </a:endParaRPr>
-          </a:p>
-        </p:txBody>
-      </p:sp>
-      <p:sp>
-        <p:nvSpPr>
-          <p:cNvPr id="83" name="PlaceHolder 7"/>
+          <a:bodyPr lIns="0" rIns="0" tIns="0" bIns="0">
+            <a:normAutofit/>
+          </a:bodyPr>
+          <a:p>
+            <a:endParaRPr b="0" lang="en-PH" sz="3200" spc="-1" strike="noStrike">
+              <a:latin typeface="Arial"/>
+            </a:endParaRPr>
+          </a:p>
+        </p:txBody>
+      </p:sp>
+      <p:sp>
+        <p:nvSpPr>
+          <p:cNvPr id="77" name="PlaceHolder 7"/>
           <p:cNvSpPr>
             <a:spLocks noGrp="1"/>
           </p:cNvSpPr>
@@ -2010,13 +1948,12 @@
           </a:prstGeom>
         </p:spPr>
         <p:txBody>
-          <a:bodyPr lIns="0" rIns="0" tIns="0" bIns="0"/>
-          <a:p>
-            <a:endParaRPr b="1" lang="en-US" sz="2200" spc="-1" strike="noStrike">
-              <a:solidFill>
-                <a:srgbClr val="000000"/>
-              </a:solidFill>
-              <a:latin typeface="Source Sans Pro Black"/>
+          <a:bodyPr lIns="0" rIns="0" tIns="0" bIns="0">
+            <a:normAutofit/>
+          </a:bodyPr>
+          <a:p>
+            <a:endParaRPr b="0" lang="en-PH" sz="3200" spc="-1" strike="noStrike">
+              <a:latin typeface="Arial"/>
             </a:endParaRPr>
           </a:p>
         </p:txBody>
@@ -2045,7 +1982,7 @@
       </p:grpSpPr>
       <p:sp>
         <p:nvSpPr>
-          <p:cNvPr id="8" name="PlaceHolder 1"/>
+          <p:cNvPr id="5" name="PlaceHolder 1"/>
           <p:cNvSpPr>
             <a:spLocks noGrp="1"/>
           </p:cNvSpPr>
@@ -2056,7 +1993,7 @@
         <p:spPr>
           <a:xfrm>
             <a:off x="504000" y="805320"/>
-            <a:ext cx="9071640" cy="1262160"/>
+            <a:ext cx="9071280" cy="1261800"/>
           </a:xfrm>
           <a:prstGeom prst="rect">
             <a:avLst/>
@@ -2065,18 +2002,16 @@
         <p:txBody>
           <a:bodyPr lIns="0" rIns="0" tIns="0" bIns="0" anchor="ctr"/>
           <a:p>
-            <a:endParaRPr b="1" lang="en-US" sz="3200" spc="-1" strike="noStrike">
-              <a:solidFill>
-                <a:srgbClr val="000000"/>
-              </a:solidFill>
-              <a:latin typeface="Source Sans Pro Black"/>
-            </a:endParaRPr>
-          </a:p>
-        </p:txBody>
-      </p:sp>
-      <p:sp>
-        <p:nvSpPr>
-          <p:cNvPr id="9" name="PlaceHolder 2"/>
+            <a:pPr algn="ctr"/>
+            <a:endParaRPr b="0" lang="en-PH" sz="4400" spc="-1" strike="noStrike">
+              <a:latin typeface="Arial"/>
+            </a:endParaRPr>
+          </a:p>
+        </p:txBody>
+      </p:sp>
+      <p:sp>
+        <p:nvSpPr>
+          <p:cNvPr id="6" name="PlaceHolder 2"/>
           <p:cNvSpPr>
             <a:spLocks noGrp="1"/>
           </p:cNvSpPr>
@@ -2087,20 +2022,19 @@
         <p:spPr>
           <a:xfrm>
             <a:off x="504000" y="2273040"/>
-            <a:ext cx="9071640" cy="4384800"/>
-          </a:xfrm>
-          <a:prstGeom prst="rect">
-            <a:avLst/>
-          </a:prstGeom>
-        </p:spPr>
-        <p:txBody>
-          <a:bodyPr lIns="0" rIns="0" tIns="0" bIns="0"/>
-          <a:p>
-            <a:endParaRPr b="1" lang="en-US" sz="2200" spc="-1" strike="noStrike">
-              <a:solidFill>
-                <a:srgbClr val="000000"/>
-              </a:solidFill>
-              <a:latin typeface="Source Sans Pro Black"/>
+            <a:ext cx="9071280" cy="4384440"/>
+          </a:xfrm>
+          <a:prstGeom prst="rect">
+            <a:avLst/>
+          </a:prstGeom>
+        </p:spPr>
+        <p:txBody>
+          <a:bodyPr lIns="0" rIns="0" tIns="0" bIns="0">
+            <a:normAutofit/>
+          </a:bodyPr>
+          <a:p>
+            <a:endParaRPr b="0" lang="en-PH" sz="3200" spc="-1" strike="noStrike">
+              <a:latin typeface="Arial"/>
             </a:endParaRPr>
           </a:p>
         </p:txBody>
@@ -2129,7 +2063,7 @@
       </p:grpSpPr>
       <p:sp>
         <p:nvSpPr>
-          <p:cNvPr id="10" name="PlaceHolder 1"/>
+          <p:cNvPr id="7" name="PlaceHolder 1"/>
           <p:cNvSpPr>
             <a:spLocks noGrp="1"/>
           </p:cNvSpPr>
@@ -2140,7 +2074,7 @@
         <p:spPr>
           <a:xfrm>
             <a:off x="504000" y="805320"/>
-            <a:ext cx="9071640" cy="1262160"/>
+            <a:ext cx="9071280" cy="1261800"/>
           </a:xfrm>
           <a:prstGeom prst="rect">
             <a:avLst/>
@@ -2149,18 +2083,16 @@
         <p:txBody>
           <a:bodyPr lIns="0" rIns="0" tIns="0" bIns="0" anchor="ctr"/>
           <a:p>
-            <a:endParaRPr b="1" lang="en-US" sz="3200" spc="-1" strike="noStrike">
-              <a:solidFill>
-                <a:srgbClr val="000000"/>
-              </a:solidFill>
-              <a:latin typeface="Source Sans Pro Black"/>
-            </a:endParaRPr>
-          </a:p>
-        </p:txBody>
-      </p:sp>
-      <p:sp>
-        <p:nvSpPr>
-          <p:cNvPr id="11" name="PlaceHolder 2"/>
+            <a:pPr algn="ctr"/>
+            <a:endParaRPr b="0" lang="en-PH" sz="4400" spc="-1" strike="noStrike">
+              <a:latin typeface="Arial"/>
+            </a:endParaRPr>
+          </a:p>
+        </p:txBody>
+      </p:sp>
+      <p:sp>
+        <p:nvSpPr>
+          <p:cNvPr id="8" name="PlaceHolder 2"/>
           <p:cNvSpPr>
             <a:spLocks noGrp="1"/>
           </p:cNvSpPr>
@@ -2171,51 +2103,49 @@
         <p:spPr>
           <a:xfrm>
             <a:off x="504000" y="2273040"/>
-            <a:ext cx="4426920" cy="4384800"/>
-          </a:xfrm>
-          <a:prstGeom prst="rect">
-            <a:avLst/>
-          </a:prstGeom>
-        </p:spPr>
-        <p:txBody>
-          <a:bodyPr lIns="0" rIns="0" tIns="0" bIns="0"/>
-          <a:p>
-            <a:endParaRPr b="1" lang="en-US" sz="2200" spc="-1" strike="noStrike">
-              <a:solidFill>
-                <a:srgbClr val="000000"/>
-              </a:solidFill>
-              <a:latin typeface="Source Sans Pro Black"/>
-            </a:endParaRPr>
-          </a:p>
-        </p:txBody>
-      </p:sp>
-      <p:sp>
-        <p:nvSpPr>
-          <p:cNvPr id="12" name="PlaceHolder 3"/>
-          <p:cNvSpPr>
-            <a:spLocks noGrp="1"/>
-          </p:cNvSpPr>
-          <p:nvPr>
-            <p:ph type="body"/>
-          </p:nvPr>
-        </p:nvSpPr>
-        <p:spPr>
-          <a:xfrm>
-            <a:off x="5152680" y="2273040"/>
-            <a:ext cx="4426920" cy="4384800"/>
-          </a:xfrm>
-          <a:prstGeom prst="rect">
-            <a:avLst/>
-          </a:prstGeom>
-        </p:spPr>
-        <p:txBody>
-          <a:bodyPr lIns="0" rIns="0" tIns="0" bIns="0"/>
-          <a:p>
-            <a:endParaRPr b="1" lang="en-US" sz="2200" spc="-1" strike="noStrike">
-              <a:solidFill>
-                <a:srgbClr val="000000"/>
-              </a:solidFill>
-              <a:latin typeface="Source Sans Pro Black"/>
+            <a:ext cx="4426560" cy="4384440"/>
+          </a:xfrm>
+          <a:prstGeom prst="rect">
+            <a:avLst/>
+          </a:prstGeom>
+        </p:spPr>
+        <p:txBody>
+          <a:bodyPr lIns="0" rIns="0" tIns="0" bIns="0">
+            <a:normAutofit/>
+          </a:bodyPr>
+          <a:p>
+            <a:endParaRPr b="0" lang="en-PH" sz="3200" spc="-1" strike="noStrike">
+              <a:latin typeface="Arial"/>
+            </a:endParaRPr>
+          </a:p>
+        </p:txBody>
+      </p:sp>
+      <p:sp>
+        <p:nvSpPr>
+          <p:cNvPr id="9" name="PlaceHolder 3"/>
+          <p:cNvSpPr>
+            <a:spLocks noGrp="1"/>
+          </p:cNvSpPr>
+          <p:nvPr>
+            <p:ph type="body"/>
+          </p:nvPr>
+        </p:nvSpPr>
+        <p:spPr>
+          <a:xfrm>
+            <a:off x="5152320" y="2273040"/>
+            <a:ext cx="4426560" cy="4384440"/>
+          </a:xfrm>
+          <a:prstGeom prst="rect">
+            <a:avLst/>
+          </a:prstGeom>
+        </p:spPr>
+        <p:txBody>
+          <a:bodyPr lIns="0" rIns="0" tIns="0" bIns="0">
+            <a:normAutofit/>
+          </a:bodyPr>
+          <a:p>
+            <a:endParaRPr b="0" lang="en-PH" sz="3200" spc="-1" strike="noStrike">
+              <a:latin typeface="Arial"/>
             </a:endParaRPr>
           </a:p>
         </p:txBody>
@@ -2244,7 +2174,7 @@
       </p:grpSpPr>
       <p:sp>
         <p:nvSpPr>
-          <p:cNvPr id="13" name="PlaceHolder 1"/>
+          <p:cNvPr id="10" name="PlaceHolder 1"/>
           <p:cNvSpPr>
             <a:spLocks noGrp="1"/>
           </p:cNvSpPr>
@@ -2255,7 +2185,7 @@
         <p:spPr>
           <a:xfrm>
             <a:off x="504000" y="805320"/>
-            <a:ext cx="9071640" cy="1262160"/>
+            <a:ext cx="9071280" cy="1261800"/>
           </a:xfrm>
           <a:prstGeom prst="rect">
             <a:avLst/>
@@ -2264,11 +2194,9 @@
         <p:txBody>
           <a:bodyPr lIns="0" rIns="0" tIns="0" bIns="0" anchor="ctr"/>
           <a:p>
-            <a:endParaRPr b="1" lang="en-US" sz="3200" spc="-1" strike="noStrike">
-              <a:solidFill>
-                <a:srgbClr val="000000"/>
-              </a:solidFill>
-              <a:latin typeface="Source Sans Pro Black"/>
+            <a:pPr algn="ctr"/>
+            <a:endParaRPr b="0" lang="en-PH" sz="4400" spc="-1" strike="noStrike">
+              <a:latin typeface="Arial"/>
             </a:endParaRPr>
           </a:p>
         </p:txBody>
@@ -2297,7 +2225,7 @@
       </p:grpSpPr>
       <p:sp>
         <p:nvSpPr>
-          <p:cNvPr id="14" name="PlaceHolder 1"/>
+          <p:cNvPr id="11" name="PlaceHolder 1"/>
           <p:cNvSpPr>
             <a:spLocks noGrp="1"/>
           </p:cNvSpPr>
@@ -2308,7 +2236,7 @@
         <p:spPr>
           <a:xfrm>
             <a:off x="504000" y="805320"/>
-            <a:ext cx="9071640" cy="5851800"/>
+            <a:ext cx="9071280" cy="5850360"/>
           </a:xfrm>
           <a:prstGeom prst="rect">
             <a:avLst/>
@@ -2318,8 +2246,8 @@
           <a:bodyPr lIns="0" rIns="0" tIns="0" bIns="0" anchor="ctr"/>
           <a:p>
             <a:pPr algn="ctr"/>
-            <a:endParaRPr b="1" lang="en-US" sz="3200" spc="-1" strike="noStrike">
-              <a:latin typeface="Source Sans Pro Black"/>
+            <a:endParaRPr b="0" lang="en-PH" sz="3200" spc="-1" strike="noStrike">
+              <a:latin typeface="Arial"/>
             </a:endParaRPr>
           </a:p>
         </p:txBody>
@@ -2348,7 +2276,7 @@
       </p:grpSpPr>
       <p:sp>
         <p:nvSpPr>
-          <p:cNvPr id="15" name="PlaceHolder 1"/>
+          <p:cNvPr id="12" name="PlaceHolder 1"/>
           <p:cNvSpPr>
             <a:spLocks noGrp="1"/>
           </p:cNvSpPr>
@@ -2359,7 +2287,7 @@
         <p:spPr>
           <a:xfrm>
             <a:off x="504000" y="805320"/>
-            <a:ext cx="9071640" cy="1262160"/>
+            <a:ext cx="9071280" cy="1261800"/>
           </a:xfrm>
           <a:prstGeom prst="rect">
             <a:avLst/>
@@ -2368,18 +2296,16 @@
         <p:txBody>
           <a:bodyPr lIns="0" rIns="0" tIns="0" bIns="0" anchor="ctr"/>
           <a:p>
-            <a:endParaRPr b="1" lang="en-US" sz="3200" spc="-1" strike="noStrike">
-              <a:solidFill>
-                <a:srgbClr val="000000"/>
-              </a:solidFill>
-              <a:latin typeface="Source Sans Pro Black"/>
-            </a:endParaRPr>
-          </a:p>
-        </p:txBody>
-      </p:sp>
-      <p:sp>
-        <p:nvSpPr>
-          <p:cNvPr id="16" name="PlaceHolder 2"/>
+            <a:pPr algn="ctr"/>
+            <a:endParaRPr b="0" lang="en-PH" sz="4400" spc="-1" strike="noStrike">
+              <a:latin typeface="Arial"/>
+            </a:endParaRPr>
+          </a:p>
+        </p:txBody>
+      </p:sp>
+      <p:sp>
+        <p:nvSpPr>
+          <p:cNvPr id="13" name="PlaceHolder 2"/>
           <p:cNvSpPr>
             <a:spLocks noGrp="1"/>
           </p:cNvSpPr>
@@ -2390,58 +2316,56 @@
         <p:spPr>
           <a:xfrm>
             <a:off x="504000" y="2273040"/>
-            <a:ext cx="4426920" cy="2091240"/>
-          </a:xfrm>
-          <a:prstGeom prst="rect">
-            <a:avLst/>
-          </a:prstGeom>
-        </p:spPr>
-        <p:txBody>
-          <a:bodyPr lIns="0" rIns="0" tIns="0" bIns="0"/>
-          <a:p>
-            <a:endParaRPr b="1" lang="en-US" sz="2200" spc="-1" strike="noStrike">
-              <a:solidFill>
-                <a:srgbClr val="000000"/>
-              </a:solidFill>
-              <a:latin typeface="Source Sans Pro Black"/>
-            </a:endParaRPr>
-          </a:p>
-        </p:txBody>
-      </p:sp>
-      <p:sp>
-        <p:nvSpPr>
-          <p:cNvPr id="17" name="PlaceHolder 3"/>
-          <p:cNvSpPr>
-            <a:spLocks noGrp="1"/>
-          </p:cNvSpPr>
-          <p:nvPr>
-            <p:ph type="body"/>
-          </p:nvPr>
-        </p:nvSpPr>
-        <p:spPr>
-          <a:xfrm>
-            <a:off x="5152680" y="2273040"/>
-            <a:ext cx="4426920" cy="4384800"/>
-          </a:xfrm>
-          <a:prstGeom prst="rect">
-            <a:avLst/>
-          </a:prstGeom>
-        </p:spPr>
-        <p:txBody>
-          <a:bodyPr lIns="0" rIns="0" tIns="0" bIns="0"/>
-          <a:p>
-            <a:endParaRPr b="1" lang="en-US" sz="2200" spc="-1" strike="noStrike">
-              <a:solidFill>
-                <a:srgbClr val="000000"/>
-              </a:solidFill>
-              <a:latin typeface="Source Sans Pro Black"/>
-            </a:endParaRPr>
-          </a:p>
-        </p:txBody>
-      </p:sp>
-      <p:sp>
-        <p:nvSpPr>
-          <p:cNvPr id="18" name="PlaceHolder 4"/>
+            <a:ext cx="4426560" cy="2091240"/>
+          </a:xfrm>
+          <a:prstGeom prst="rect">
+            <a:avLst/>
+          </a:prstGeom>
+        </p:spPr>
+        <p:txBody>
+          <a:bodyPr lIns="0" rIns="0" tIns="0" bIns="0">
+            <a:normAutofit/>
+          </a:bodyPr>
+          <a:p>
+            <a:endParaRPr b="0" lang="en-PH" sz="3200" spc="-1" strike="noStrike">
+              <a:latin typeface="Arial"/>
+            </a:endParaRPr>
+          </a:p>
+        </p:txBody>
+      </p:sp>
+      <p:sp>
+        <p:nvSpPr>
+          <p:cNvPr id="14" name="PlaceHolder 3"/>
+          <p:cNvSpPr>
+            <a:spLocks noGrp="1"/>
+          </p:cNvSpPr>
+          <p:nvPr>
+            <p:ph type="body"/>
+          </p:nvPr>
+        </p:nvSpPr>
+        <p:spPr>
+          <a:xfrm>
+            <a:off x="5152320" y="2273040"/>
+            <a:ext cx="4426560" cy="4384440"/>
+          </a:xfrm>
+          <a:prstGeom prst="rect">
+            <a:avLst/>
+          </a:prstGeom>
+        </p:spPr>
+        <p:txBody>
+          <a:bodyPr lIns="0" rIns="0" tIns="0" bIns="0">
+            <a:normAutofit/>
+          </a:bodyPr>
+          <a:p>
+            <a:endParaRPr b="0" lang="en-PH" sz="3200" spc="-1" strike="noStrike">
+              <a:latin typeface="Arial"/>
+            </a:endParaRPr>
+          </a:p>
+        </p:txBody>
+      </p:sp>
+      <p:sp>
+        <p:nvSpPr>
+          <p:cNvPr id="15" name="PlaceHolder 4"/>
           <p:cNvSpPr>
             <a:spLocks noGrp="1"/>
           </p:cNvSpPr>
@@ -2452,20 +2376,19 @@
         <p:spPr>
           <a:xfrm>
             <a:off x="504000" y="4563360"/>
-            <a:ext cx="4426920" cy="2091240"/>
-          </a:xfrm>
-          <a:prstGeom prst="rect">
-            <a:avLst/>
-          </a:prstGeom>
-        </p:spPr>
-        <p:txBody>
-          <a:bodyPr lIns="0" rIns="0" tIns="0" bIns="0"/>
-          <a:p>
-            <a:endParaRPr b="1" lang="en-US" sz="2200" spc="-1" strike="noStrike">
-              <a:solidFill>
-                <a:srgbClr val="000000"/>
-              </a:solidFill>
-              <a:latin typeface="Source Sans Pro Black"/>
+            <a:ext cx="4426560" cy="2091240"/>
+          </a:xfrm>
+          <a:prstGeom prst="rect">
+            <a:avLst/>
+          </a:prstGeom>
+        </p:spPr>
+        <p:txBody>
+          <a:bodyPr lIns="0" rIns="0" tIns="0" bIns="0">
+            <a:normAutofit/>
+          </a:bodyPr>
+          <a:p>
+            <a:endParaRPr b="0" lang="en-PH" sz="3200" spc="-1" strike="noStrike">
+              <a:latin typeface="Arial"/>
             </a:endParaRPr>
           </a:p>
         </p:txBody>
@@ -2494,7 +2417,7 @@
       </p:grpSpPr>
       <p:sp>
         <p:nvSpPr>
-          <p:cNvPr id="19" name="PlaceHolder 1"/>
+          <p:cNvPr id="16" name="PlaceHolder 1"/>
           <p:cNvSpPr>
             <a:spLocks noGrp="1"/>
           </p:cNvSpPr>
@@ -2505,7 +2428,7 @@
         <p:spPr>
           <a:xfrm>
             <a:off x="504000" y="805320"/>
-            <a:ext cx="9071640" cy="1262160"/>
+            <a:ext cx="9071280" cy="1261800"/>
           </a:xfrm>
           <a:prstGeom prst="rect">
             <a:avLst/>
@@ -2514,18 +2437,16 @@
         <p:txBody>
           <a:bodyPr lIns="0" rIns="0" tIns="0" bIns="0" anchor="ctr"/>
           <a:p>
-            <a:endParaRPr b="1" lang="en-US" sz="3200" spc="-1" strike="noStrike">
-              <a:solidFill>
-                <a:srgbClr val="000000"/>
-              </a:solidFill>
-              <a:latin typeface="Source Sans Pro Black"/>
-            </a:endParaRPr>
-          </a:p>
-        </p:txBody>
-      </p:sp>
-      <p:sp>
-        <p:nvSpPr>
-          <p:cNvPr id="20" name="PlaceHolder 2"/>
+            <a:pPr algn="ctr"/>
+            <a:endParaRPr b="0" lang="en-PH" sz="4400" spc="-1" strike="noStrike">
+              <a:latin typeface="Arial"/>
+            </a:endParaRPr>
+          </a:p>
+        </p:txBody>
+      </p:sp>
+      <p:sp>
+        <p:nvSpPr>
+          <p:cNvPr id="17" name="PlaceHolder 2"/>
           <p:cNvSpPr>
             <a:spLocks noGrp="1"/>
           </p:cNvSpPr>
@@ -2536,82 +2457,79 @@
         <p:spPr>
           <a:xfrm>
             <a:off x="504000" y="2273040"/>
-            <a:ext cx="4426920" cy="4384800"/>
-          </a:xfrm>
-          <a:prstGeom prst="rect">
-            <a:avLst/>
-          </a:prstGeom>
-        </p:spPr>
-        <p:txBody>
-          <a:bodyPr lIns="0" rIns="0" tIns="0" bIns="0"/>
-          <a:p>
-            <a:endParaRPr b="1" lang="en-US" sz="2200" spc="-1" strike="noStrike">
-              <a:solidFill>
-                <a:srgbClr val="000000"/>
-              </a:solidFill>
-              <a:latin typeface="Source Sans Pro Black"/>
-            </a:endParaRPr>
-          </a:p>
-        </p:txBody>
-      </p:sp>
-      <p:sp>
-        <p:nvSpPr>
-          <p:cNvPr id="21" name="PlaceHolder 3"/>
-          <p:cNvSpPr>
-            <a:spLocks noGrp="1"/>
-          </p:cNvSpPr>
-          <p:nvPr>
-            <p:ph type="body"/>
-          </p:nvPr>
-        </p:nvSpPr>
-        <p:spPr>
-          <a:xfrm>
-            <a:off x="5152680" y="2273040"/>
-            <a:ext cx="4426920" cy="2091240"/>
-          </a:xfrm>
-          <a:prstGeom prst="rect">
-            <a:avLst/>
-          </a:prstGeom>
-        </p:spPr>
-        <p:txBody>
-          <a:bodyPr lIns="0" rIns="0" tIns="0" bIns="0"/>
-          <a:p>
-            <a:endParaRPr b="1" lang="en-US" sz="2200" spc="-1" strike="noStrike">
-              <a:solidFill>
-                <a:srgbClr val="000000"/>
-              </a:solidFill>
-              <a:latin typeface="Source Sans Pro Black"/>
-            </a:endParaRPr>
-          </a:p>
-        </p:txBody>
-      </p:sp>
-      <p:sp>
-        <p:nvSpPr>
-          <p:cNvPr id="22" name="PlaceHolder 4"/>
-          <p:cNvSpPr>
-            <a:spLocks noGrp="1"/>
-          </p:cNvSpPr>
-          <p:nvPr>
-            <p:ph type="body"/>
-          </p:nvPr>
-        </p:nvSpPr>
-        <p:spPr>
-          <a:xfrm>
-            <a:off x="5152680" y="4563360"/>
-            <a:ext cx="4426920" cy="2091240"/>
-          </a:xfrm>
-          <a:prstGeom prst="rect">
-            <a:avLst/>
-          </a:prstGeom>
-        </p:spPr>
-        <p:txBody>
-          <a:bodyPr lIns="0" rIns="0" tIns="0" bIns="0"/>
-          <a:p>
-            <a:endParaRPr b="1" lang="en-US" sz="2200" spc="-1" strike="noStrike">
-              <a:solidFill>
-                <a:srgbClr val="000000"/>
-              </a:solidFill>
-              <a:latin typeface="Source Sans Pro Black"/>
+            <a:ext cx="4426560" cy="4384440"/>
+          </a:xfrm>
+          <a:prstGeom prst="rect">
+            <a:avLst/>
+          </a:prstGeom>
+        </p:spPr>
+        <p:txBody>
+          <a:bodyPr lIns="0" rIns="0" tIns="0" bIns="0">
+            <a:normAutofit/>
+          </a:bodyPr>
+          <a:p>
+            <a:endParaRPr b="0" lang="en-PH" sz="3200" spc="-1" strike="noStrike">
+              <a:latin typeface="Arial"/>
+            </a:endParaRPr>
+          </a:p>
+        </p:txBody>
+      </p:sp>
+      <p:sp>
+        <p:nvSpPr>
+          <p:cNvPr id="18" name="PlaceHolder 3"/>
+          <p:cNvSpPr>
+            <a:spLocks noGrp="1"/>
+          </p:cNvSpPr>
+          <p:nvPr>
+            <p:ph type="body"/>
+          </p:nvPr>
+        </p:nvSpPr>
+        <p:spPr>
+          <a:xfrm>
+            <a:off x="5152320" y="2273040"/>
+            <a:ext cx="4426560" cy="2091240"/>
+          </a:xfrm>
+          <a:prstGeom prst="rect">
+            <a:avLst/>
+          </a:prstGeom>
+        </p:spPr>
+        <p:txBody>
+          <a:bodyPr lIns="0" rIns="0" tIns="0" bIns="0">
+            <a:normAutofit/>
+          </a:bodyPr>
+          <a:p>
+            <a:endParaRPr b="0" lang="en-PH" sz="3200" spc="-1" strike="noStrike">
+              <a:latin typeface="Arial"/>
+            </a:endParaRPr>
+          </a:p>
+        </p:txBody>
+      </p:sp>
+      <p:sp>
+        <p:nvSpPr>
+          <p:cNvPr id="19" name="PlaceHolder 4"/>
+          <p:cNvSpPr>
+            <a:spLocks noGrp="1"/>
+          </p:cNvSpPr>
+          <p:nvPr>
+            <p:ph type="body"/>
+          </p:nvPr>
+        </p:nvSpPr>
+        <p:spPr>
+          <a:xfrm>
+            <a:off x="5152320" y="4563360"/>
+            <a:ext cx="4426560" cy="2091240"/>
+          </a:xfrm>
+          <a:prstGeom prst="rect">
+            <a:avLst/>
+          </a:prstGeom>
+        </p:spPr>
+        <p:txBody>
+          <a:bodyPr lIns="0" rIns="0" tIns="0" bIns="0">
+            <a:normAutofit/>
+          </a:bodyPr>
+          <a:p>
+            <a:endParaRPr b="0" lang="en-PH" sz="3200" spc="-1" strike="noStrike">
+              <a:latin typeface="Arial"/>
             </a:endParaRPr>
           </a:p>
         </p:txBody>
@@ -2640,7 +2558,7 @@
       </p:grpSpPr>
       <p:sp>
         <p:nvSpPr>
-          <p:cNvPr id="23" name="PlaceHolder 1"/>
+          <p:cNvPr id="20" name="PlaceHolder 1"/>
           <p:cNvSpPr>
             <a:spLocks noGrp="1"/>
           </p:cNvSpPr>
@@ -2651,7 +2569,7 @@
         <p:spPr>
           <a:xfrm>
             <a:off x="504000" y="805320"/>
-            <a:ext cx="9071640" cy="1262160"/>
+            <a:ext cx="9071280" cy="1261800"/>
           </a:xfrm>
           <a:prstGeom prst="rect">
             <a:avLst/>
@@ -2660,18 +2578,16 @@
         <p:txBody>
           <a:bodyPr lIns="0" rIns="0" tIns="0" bIns="0" anchor="ctr"/>
           <a:p>
-            <a:endParaRPr b="1" lang="en-US" sz="3200" spc="-1" strike="noStrike">
-              <a:solidFill>
-                <a:srgbClr val="000000"/>
-              </a:solidFill>
-              <a:latin typeface="Source Sans Pro Black"/>
-            </a:endParaRPr>
-          </a:p>
-        </p:txBody>
-      </p:sp>
-      <p:sp>
-        <p:nvSpPr>
-          <p:cNvPr id="24" name="PlaceHolder 2"/>
+            <a:pPr algn="ctr"/>
+            <a:endParaRPr b="0" lang="en-PH" sz="4400" spc="-1" strike="noStrike">
+              <a:latin typeface="Arial"/>
+            </a:endParaRPr>
+          </a:p>
+        </p:txBody>
+      </p:sp>
+      <p:sp>
+        <p:nvSpPr>
+          <p:cNvPr id="21" name="PlaceHolder 2"/>
           <p:cNvSpPr>
             <a:spLocks noGrp="1"/>
           </p:cNvSpPr>
@@ -2682,58 +2598,56 @@
         <p:spPr>
           <a:xfrm>
             <a:off x="504000" y="2273040"/>
-            <a:ext cx="4426920" cy="2091240"/>
-          </a:xfrm>
-          <a:prstGeom prst="rect">
-            <a:avLst/>
-          </a:prstGeom>
-        </p:spPr>
-        <p:txBody>
-          <a:bodyPr lIns="0" rIns="0" tIns="0" bIns="0"/>
-          <a:p>
-            <a:endParaRPr b="1" lang="en-US" sz="2200" spc="-1" strike="noStrike">
-              <a:solidFill>
-                <a:srgbClr val="000000"/>
-              </a:solidFill>
-              <a:latin typeface="Source Sans Pro Black"/>
-            </a:endParaRPr>
-          </a:p>
-        </p:txBody>
-      </p:sp>
-      <p:sp>
-        <p:nvSpPr>
-          <p:cNvPr id="25" name="PlaceHolder 3"/>
-          <p:cNvSpPr>
-            <a:spLocks noGrp="1"/>
-          </p:cNvSpPr>
-          <p:nvPr>
-            <p:ph type="body"/>
-          </p:nvPr>
-        </p:nvSpPr>
-        <p:spPr>
-          <a:xfrm>
-            <a:off x="5152680" y="2273040"/>
-            <a:ext cx="4426920" cy="2091240"/>
-          </a:xfrm>
-          <a:prstGeom prst="rect">
-            <a:avLst/>
-          </a:prstGeom>
-        </p:spPr>
-        <p:txBody>
-          <a:bodyPr lIns="0" rIns="0" tIns="0" bIns="0"/>
-          <a:p>
-            <a:endParaRPr b="1" lang="en-US" sz="2200" spc="-1" strike="noStrike">
-              <a:solidFill>
-                <a:srgbClr val="000000"/>
-              </a:solidFill>
-              <a:latin typeface="Source Sans Pro Black"/>
-            </a:endParaRPr>
-          </a:p>
-        </p:txBody>
-      </p:sp>
-      <p:sp>
-        <p:nvSpPr>
-          <p:cNvPr id="26" name="PlaceHolder 4"/>
+            <a:ext cx="4426560" cy="2091240"/>
+          </a:xfrm>
+          <a:prstGeom prst="rect">
+            <a:avLst/>
+          </a:prstGeom>
+        </p:spPr>
+        <p:txBody>
+          <a:bodyPr lIns="0" rIns="0" tIns="0" bIns="0">
+            <a:normAutofit/>
+          </a:bodyPr>
+          <a:p>
+            <a:endParaRPr b="0" lang="en-PH" sz="3200" spc="-1" strike="noStrike">
+              <a:latin typeface="Arial"/>
+            </a:endParaRPr>
+          </a:p>
+        </p:txBody>
+      </p:sp>
+      <p:sp>
+        <p:nvSpPr>
+          <p:cNvPr id="22" name="PlaceHolder 3"/>
+          <p:cNvSpPr>
+            <a:spLocks noGrp="1"/>
+          </p:cNvSpPr>
+          <p:nvPr>
+            <p:ph type="body"/>
+          </p:nvPr>
+        </p:nvSpPr>
+        <p:spPr>
+          <a:xfrm>
+            <a:off x="5152320" y="2273040"/>
+            <a:ext cx="4426560" cy="2091240"/>
+          </a:xfrm>
+          <a:prstGeom prst="rect">
+            <a:avLst/>
+          </a:prstGeom>
+        </p:spPr>
+        <p:txBody>
+          <a:bodyPr lIns="0" rIns="0" tIns="0" bIns="0">
+            <a:normAutofit/>
+          </a:bodyPr>
+          <a:p>
+            <a:endParaRPr b="0" lang="en-PH" sz="3200" spc="-1" strike="noStrike">
+              <a:latin typeface="Arial"/>
+            </a:endParaRPr>
+          </a:p>
+        </p:txBody>
+      </p:sp>
+      <p:sp>
+        <p:nvSpPr>
+          <p:cNvPr id="23" name="PlaceHolder 4"/>
           <p:cNvSpPr>
             <a:spLocks noGrp="1"/>
           </p:cNvSpPr>
@@ -2744,20 +2658,19 @@
         <p:spPr>
           <a:xfrm>
             <a:off x="504000" y="4563360"/>
-            <a:ext cx="9071640" cy="2091240"/>
-          </a:xfrm>
-          <a:prstGeom prst="rect">
-            <a:avLst/>
-          </a:prstGeom>
-        </p:spPr>
-        <p:txBody>
-          <a:bodyPr lIns="0" rIns="0" tIns="0" bIns="0"/>
-          <a:p>
-            <a:endParaRPr b="1" lang="en-US" sz="2200" spc="-1" strike="noStrike">
-              <a:solidFill>
-                <a:srgbClr val="000000"/>
-              </a:solidFill>
-              <a:latin typeface="Source Sans Pro Black"/>
+            <a:ext cx="9071280" cy="2091240"/>
+          </a:xfrm>
+          <a:prstGeom prst="rect">
+            <a:avLst/>
+          </a:prstGeom>
+        </p:spPr>
+        <p:txBody>
+          <a:bodyPr lIns="0" rIns="0" tIns="0" bIns="0">
+            <a:normAutofit/>
+          </a:bodyPr>
+          <a:p>
+            <a:endParaRPr b="0" lang="en-PH" sz="3200" spc="-1" strike="noStrike">
+              <a:latin typeface="Arial"/>
             </a:endParaRPr>
           </a:p>
         </p:txBody>
@@ -2797,7 +2710,7 @@
         <p:spPr>
           <a:xfrm>
             <a:off x="0" y="16200"/>
-            <a:ext cx="10080000" cy="7570080"/>
+            <a:ext cx="10079640" cy="7569720"/>
           </a:xfrm>
           <a:prstGeom prst="rect">
             <a:avLst/>
@@ -2819,8 +2732,8 @@
         </p:nvSpPr>
         <p:spPr>
           <a:xfrm>
-            <a:off x="5011200" y="3317400"/>
-            <a:ext cx="5895000" cy="1143000"/>
+            <a:off x="504000" y="805320"/>
+            <a:ext cx="9071280" cy="1261800"/>
           </a:xfrm>
           <a:prstGeom prst="rect">
             <a:avLst/>
@@ -2830,19 +2743,13 @@
           <a:bodyPr lIns="0" rIns="0" tIns="0" bIns="0" anchor="ctr"/>
           <a:p>
             <a:r>
-              <a:rPr b="1" lang="en-US" sz="4400" spc="-1" strike="noStrike">
-                <a:solidFill>
-                  <a:srgbClr val="ffffff"/>
-                </a:solidFill>
-                <a:latin typeface="Source Sans Pro Black"/>
+              <a:rPr b="0" lang="en-PH" sz="1800" spc="-1" strike="noStrike">
+                <a:latin typeface="Arial"/>
               </a:rPr>
               <a:t>Click to edit the title text format</a:t>
             </a:r>
-            <a:endParaRPr b="1" lang="en-US" sz="4400" spc="-1" strike="noStrike">
-              <a:solidFill>
-                <a:srgbClr val="ffffff"/>
-              </a:solidFill>
-              <a:latin typeface="Source Sans Pro Black"/>
+            <a:endParaRPr b="0" lang="en-PH" sz="1800" spc="-1" strike="noStrike">
+              <a:latin typeface="Arial"/>
             </a:endParaRPr>
           </a:p>
         </p:txBody>
@@ -2854,144 +2761,27 @@
             <a:spLocks noGrp="1"/>
           </p:cNvSpPr>
           <p:nvPr>
-            <p:ph type="dt"/>
-          </p:nvPr>
-        </p:nvSpPr>
-        <p:spPr>
-          <a:xfrm>
-            <a:off x="288720" y="6995160"/>
-            <a:ext cx="1677600" cy="521280"/>
-          </a:xfrm>
-          <a:prstGeom prst="rect">
-            <a:avLst/>
-          </a:prstGeom>
-        </p:spPr>
-        <p:txBody>
-          <a:bodyPr lIns="0" rIns="0" tIns="0" bIns="0"/>
-          <a:p>
-            <a:r>
-              <a:rPr b="0" lang="en-US" sz="1400" spc="-1" strike="noStrike">
-                <a:solidFill>
-                  <a:srgbClr val="ffffff"/>
-                </a:solidFill>
-                <a:latin typeface="Century Gothic"/>
-              </a:rPr>
-              <a:t>&lt;date/time&gt;</a:t>
-            </a:r>
-            <a:endParaRPr b="0" lang="en-US" sz="1400" spc="-1" strike="noStrike">
-              <a:solidFill>
-                <a:srgbClr val="ffffff"/>
-              </a:solidFill>
-              <a:latin typeface="Century Gothic"/>
-            </a:endParaRPr>
-          </a:p>
-        </p:txBody>
-      </p:sp>
-      <p:sp>
-        <p:nvSpPr>
-          <p:cNvPr id="3" name="PlaceHolder 3"/>
-          <p:cNvSpPr>
-            <a:spLocks noGrp="1"/>
-          </p:cNvSpPr>
-          <p:nvPr>
-            <p:ph type="ftr"/>
-          </p:nvPr>
-        </p:nvSpPr>
-        <p:spPr>
-          <a:xfrm>
-            <a:off x="3948120" y="6995160"/>
-            <a:ext cx="2023200" cy="521280"/>
-          </a:xfrm>
-          <a:prstGeom prst="rect">
-            <a:avLst/>
-          </a:prstGeom>
-        </p:spPr>
-        <p:txBody>
-          <a:bodyPr lIns="0" rIns="0" tIns="0" bIns="0"/>
-          <a:p>
-            <a:pPr algn="ctr"/>
-            <a:r>
-              <a:rPr b="0" lang="en-US" sz="1400" spc="-1" strike="noStrike">
-                <a:solidFill>
-                  <a:srgbClr val="ffffff"/>
-                </a:solidFill>
-                <a:latin typeface="Century Gothic"/>
-              </a:rPr>
-              <a:t>&lt;footer&gt;</a:t>
-            </a:r>
-            <a:endParaRPr b="0" lang="en-US" sz="1400" spc="-1" strike="noStrike">
-              <a:solidFill>
-                <a:srgbClr val="ffffff"/>
-              </a:solidFill>
-              <a:latin typeface="Century Gothic"/>
-            </a:endParaRPr>
-          </a:p>
-        </p:txBody>
-      </p:sp>
-      <p:sp>
-        <p:nvSpPr>
-          <p:cNvPr id="4" name="PlaceHolder 4"/>
-          <p:cNvSpPr>
-            <a:spLocks noGrp="1"/>
-          </p:cNvSpPr>
-          <p:nvPr>
-            <p:ph type="sldNum"/>
-          </p:nvPr>
-        </p:nvSpPr>
-        <p:spPr>
-          <a:xfrm>
-            <a:off x="7953120" y="6995160"/>
-            <a:ext cx="1803240" cy="521280"/>
-          </a:xfrm>
-          <a:prstGeom prst="rect">
-            <a:avLst/>
-          </a:prstGeom>
-        </p:spPr>
-        <p:txBody>
-          <a:bodyPr lIns="0" rIns="0" tIns="0" bIns="0"/>
-          <a:p>
-            <a:pPr algn="r"/>
-            <a:fld id="{87306323-AC41-4492-8A1D-0CFAB22C8F3E}" type="slidenum">
-              <a:rPr b="0" lang="en-US" sz="1400" spc="-1" strike="noStrike">
-                <a:solidFill>
-                  <a:srgbClr val="ffffff"/>
-                </a:solidFill>
-                <a:latin typeface="Century Gothic"/>
-              </a:rPr>
-              <a:t>&lt;number&gt;</a:t>
-            </a:fld>
-            <a:endParaRPr b="0" lang="en-US" sz="1400" spc="-1" strike="noStrike">
-              <a:latin typeface="Century Gothic"/>
-            </a:endParaRPr>
-          </a:p>
-        </p:txBody>
-      </p:sp>
-      <p:sp>
-        <p:nvSpPr>
-          <p:cNvPr id="5" name="PlaceHolder 5"/>
-          <p:cNvSpPr>
-            <a:spLocks noGrp="1"/>
-          </p:cNvSpPr>
-          <p:nvPr>
-            <p:ph type="body"/>
-          </p:nvPr>
-        </p:nvSpPr>
-        <p:spPr>
-          <a:xfrm>
-            <a:off x="504000" y="1769040"/>
-            <a:ext cx="9071640" cy="4384800"/>
-          </a:xfrm>
-          <a:prstGeom prst="rect">
-            <a:avLst/>
-          </a:prstGeom>
-        </p:spPr>
-        <p:txBody>
-          <a:bodyPr lIns="0" rIns="0" tIns="0" bIns="0"/>
+            <p:ph type="body"/>
+          </p:nvPr>
+        </p:nvSpPr>
+        <p:spPr>
+          <a:xfrm>
+            <a:off x="504000" y="1768680"/>
+            <a:ext cx="9072000" cy="4384080"/>
+          </a:xfrm>
+          <a:prstGeom prst="rect">
+            <a:avLst/>
+          </a:prstGeom>
+        </p:spPr>
+        <p:txBody>
+          <a:bodyPr lIns="0" rIns="0" tIns="0" bIns="0">
+            <a:normAutofit/>
+          </a:bodyPr>
           <a:p>
             <a:pPr marL="432000" indent="-324000">
-              <a:spcAft>
+              <a:spcBef>
                 <a:spcPts val="1417"/>
-              </a:spcAft>
+              </a:spcBef>
               <a:buClr>
                 <a:srgbClr val="000000"/>
               </a:buClr>
@@ -3000,20 +2790,20 @@
               <a:buChar char=""/>
             </a:pPr>
             <a:r>
-              <a:rPr b="0" lang="en-US" sz="3200" spc="-1" strike="noStrike">
+              <a:rPr b="0" lang="en-PH" sz="3200" spc="-1" strike="noStrike">
                 <a:latin typeface="Arial"/>
               </a:rPr>
               <a:t>Click to edit the outline text format</a:t>
             </a:r>
-            <a:endParaRPr b="0" lang="en-US" sz="3200" spc="-1" strike="noStrike">
+            <a:endParaRPr b="0" lang="en-PH" sz="3200" spc="-1" strike="noStrike">
               <a:latin typeface="Arial"/>
             </a:endParaRPr>
           </a:p>
           <a:p>
             <a:pPr lvl="1" marL="864000" indent="-324000">
-              <a:spcAft>
+              <a:spcBef>
                 <a:spcPts val="1134"/>
-              </a:spcAft>
+              </a:spcBef>
               <a:buClr>
                 <a:srgbClr val="000000"/>
               </a:buClr>
@@ -3022,20 +2812,20 @@
               <a:buChar char=""/>
             </a:pPr>
             <a:r>
-              <a:rPr b="0" lang="en-US" sz="2800" spc="-1" strike="noStrike">
+              <a:rPr b="0" lang="en-PH" sz="2800" spc="-1" strike="noStrike">
                 <a:latin typeface="Arial"/>
               </a:rPr>
               <a:t>Second Outline Level</a:t>
             </a:r>
-            <a:endParaRPr b="0" lang="en-US" sz="2800" spc="-1" strike="noStrike">
+            <a:endParaRPr b="0" lang="en-PH" sz="2800" spc="-1" strike="noStrike">
               <a:latin typeface="Arial"/>
             </a:endParaRPr>
           </a:p>
           <a:p>
             <a:pPr lvl="2" marL="1296000" indent="-288000">
-              <a:spcAft>
+              <a:spcBef>
                 <a:spcPts val="850"/>
-              </a:spcAft>
+              </a:spcBef>
               <a:buClr>
                 <a:srgbClr val="000000"/>
               </a:buClr>
@@ -3044,20 +2834,20 @@
               <a:buChar char=""/>
             </a:pPr>
             <a:r>
-              <a:rPr b="0" lang="en-US" sz="2400" spc="-1" strike="noStrike">
+              <a:rPr b="0" lang="en-PH" sz="2400" spc="-1" strike="noStrike">
                 <a:latin typeface="Arial"/>
               </a:rPr>
               <a:t>Third Outline Level</a:t>
             </a:r>
-            <a:endParaRPr b="0" lang="en-US" sz="2400" spc="-1" strike="noStrike">
+            <a:endParaRPr b="0" lang="en-PH" sz="2400" spc="-1" strike="noStrike">
               <a:latin typeface="Arial"/>
             </a:endParaRPr>
           </a:p>
           <a:p>
             <a:pPr lvl="3" marL="1728000" indent="-216000">
-              <a:spcAft>
+              <a:spcBef>
                 <a:spcPts val="567"/>
-              </a:spcAft>
+              </a:spcBef>
               <a:buClr>
                 <a:srgbClr val="000000"/>
               </a:buClr>
@@ -3066,20 +2856,20 @@
               <a:buChar char=""/>
             </a:pPr>
             <a:r>
-              <a:rPr b="0" lang="en-US" sz="2000" spc="-1" strike="noStrike">
+              <a:rPr b="0" lang="en-PH" sz="2000" spc="-1" strike="noStrike">
                 <a:latin typeface="Arial"/>
               </a:rPr>
               <a:t>Fourth Outline Level</a:t>
             </a:r>
-            <a:endParaRPr b="0" lang="en-US" sz="2000" spc="-1" strike="noStrike">
+            <a:endParaRPr b="0" lang="en-PH" sz="2000" spc="-1" strike="noStrike">
               <a:latin typeface="Arial"/>
             </a:endParaRPr>
           </a:p>
           <a:p>
             <a:pPr lvl="4" marL="2160000" indent="-216000">
-              <a:spcAft>
+              <a:spcBef>
                 <a:spcPts val="283"/>
-              </a:spcAft>
+              </a:spcBef>
               <a:buClr>
                 <a:srgbClr val="000000"/>
               </a:buClr>
@@ -3088,20 +2878,20 @@
               <a:buChar char=""/>
             </a:pPr>
             <a:r>
-              <a:rPr b="0" lang="en-US" sz="2000" spc="-1" strike="noStrike">
+              <a:rPr b="0" lang="en-PH" sz="2000" spc="-1" strike="noStrike">
                 <a:latin typeface="Arial"/>
               </a:rPr>
               <a:t>Fifth Outline Level</a:t>
             </a:r>
-            <a:endParaRPr b="0" lang="en-US" sz="2000" spc="-1" strike="noStrike">
+            <a:endParaRPr b="0" lang="en-PH" sz="2000" spc="-1" strike="noStrike">
               <a:latin typeface="Arial"/>
             </a:endParaRPr>
           </a:p>
           <a:p>
             <a:pPr lvl="5" marL="2592000" indent="-216000">
-              <a:spcAft>
+              <a:spcBef>
                 <a:spcPts val="283"/>
-              </a:spcAft>
+              </a:spcBef>
               <a:buClr>
                 <a:srgbClr val="000000"/>
               </a:buClr>
@@ -3110,20 +2900,20 @@
               <a:buChar char=""/>
             </a:pPr>
             <a:r>
-              <a:rPr b="0" lang="en-US" sz="2000" spc="-1" strike="noStrike">
+              <a:rPr b="0" lang="en-PH" sz="2000" spc="-1" strike="noStrike">
                 <a:latin typeface="Arial"/>
               </a:rPr>
               <a:t>Sixth Outline Level</a:t>
             </a:r>
-            <a:endParaRPr b="0" lang="en-US" sz="2000" spc="-1" strike="noStrike">
+            <a:endParaRPr b="0" lang="en-PH" sz="2000" spc="-1" strike="noStrike">
               <a:latin typeface="Arial"/>
             </a:endParaRPr>
           </a:p>
           <a:p>
             <a:pPr lvl="6" marL="3024000" indent="-216000">
-              <a:spcAft>
+              <a:spcBef>
                 <a:spcPts val="283"/>
-              </a:spcAft>
+              </a:spcBef>
               <a:buClr>
                 <a:srgbClr val="000000"/>
               </a:buClr>
@@ -3132,12 +2922,12 @@
               <a:buChar char=""/>
             </a:pPr>
             <a:r>
-              <a:rPr b="0" lang="en-US" sz="2000" spc="-1" strike="noStrike">
+              <a:rPr b="0" lang="en-PH" sz="2000" spc="-1" strike="noStrike">
                 <a:latin typeface="Arial"/>
               </a:rPr>
               <a:t>Seventh Outline Level</a:t>
             </a:r>
-            <a:endParaRPr b="0" lang="en-US" sz="2000" spc="-1" strike="noStrike">
+            <a:endParaRPr b="0" lang="en-PH" sz="2000" spc="-1" strike="noStrike">
               <a:latin typeface="Arial"/>
             </a:endParaRPr>
           </a:p>
@@ -3182,7 +2972,7 @@
       </p:grpSpPr>
       <p:pic>
         <p:nvPicPr>
-          <p:cNvPr id="42" name="" descr=""/>
+          <p:cNvPr id="39" name="" descr=""/>
           <p:cNvPicPr/>
           <p:nvPr/>
         </p:nvPicPr>
@@ -3193,7 +2983,7 @@
         <p:spPr>
           <a:xfrm>
             <a:off x="14760" y="0"/>
-            <a:ext cx="10066680" cy="7560000"/>
+            <a:ext cx="10066320" cy="7559640"/>
           </a:xfrm>
           <a:prstGeom prst="rect">
             <a:avLst/>
@@ -3205,7 +2995,7 @@
       </p:pic>
       <p:sp>
         <p:nvSpPr>
-          <p:cNvPr id="43" name="PlaceHolder 1"/>
+          <p:cNvPr id="40" name="PlaceHolder 1"/>
           <p:cNvSpPr>
             <a:spLocks noGrp="1"/>
           </p:cNvSpPr>
@@ -3216,7 +3006,7 @@
         <p:spPr>
           <a:xfrm>
             <a:off x="504000" y="805320"/>
-            <a:ext cx="9071640" cy="1262160"/>
+            <a:ext cx="9071280" cy="1261800"/>
           </a:xfrm>
           <a:prstGeom prst="rect">
             <a:avLst/>
@@ -3226,26 +3016,20 @@
           <a:bodyPr lIns="0" rIns="0" tIns="0" bIns="0" anchor="ctr"/>
           <a:p>
             <a:r>
-              <a:rPr b="1" lang="en-US" sz="3200" spc="-1" strike="noStrike">
-                <a:solidFill>
-                  <a:srgbClr val="000000"/>
-                </a:solidFill>
-                <a:latin typeface="Source Sans Pro Black"/>
+              <a:rPr b="0" lang="en-PH" sz="1800" spc="-1" strike="noStrike">
+                <a:latin typeface="Arial"/>
               </a:rPr>
               <a:t>Click to edit the title text format</a:t>
             </a:r>
-            <a:endParaRPr b="1" lang="en-US" sz="3200" spc="-1" strike="noStrike">
-              <a:solidFill>
-                <a:srgbClr val="000000"/>
-              </a:solidFill>
-              <a:latin typeface="Source Sans Pro Black"/>
-            </a:endParaRPr>
-          </a:p>
-        </p:txBody>
-      </p:sp>
-      <p:sp>
-        <p:nvSpPr>
-          <p:cNvPr id="44" name="PlaceHolder 2"/>
+            <a:endParaRPr b="0" lang="en-PH" sz="1800" spc="-1" strike="noStrike">
+              <a:latin typeface="Arial"/>
+            </a:endParaRPr>
+          </a:p>
+        </p:txBody>
+      </p:sp>
+      <p:sp>
+        <p:nvSpPr>
+          <p:cNvPr id="41" name="PlaceHolder 2"/>
           <p:cNvSpPr>
             <a:spLocks noGrp="1"/>
           </p:cNvSpPr>
@@ -3256,7 +3040,7 @@
         <p:spPr>
           <a:xfrm>
             <a:off x="504000" y="2273040"/>
-            <a:ext cx="9071640" cy="4384800"/>
+            <a:ext cx="9071280" cy="4384440"/>
           </a:xfrm>
           <a:prstGeom prst="rect">
             <a:avLst/>
@@ -3266,9 +3050,9 @@
           <a:bodyPr lIns="0" rIns="0" tIns="0" bIns="0"/>
           <a:p>
             <a:pPr marL="432000" indent="-324000">
-              <a:spcAft>
+              <a:spcBef>
                 <a:spcPts val="1417"/>
-              </a:spcAft>
+              </a:spcBef>
               <a:buClr>
                 <a:srgbClr val="000000"/>
               </a:buClr>
@@ -3277,26 +3061,20 @@
               <a:buChar char=""/>
             </a:pPr>
             <a:r>
-              <a:rPr b="1" lang="en-US" sz="2200" spc="-1" strike="noStrike">
-                <a:solidFill>
-                  <a:srgbClr val="000000"/>
-                </a:solidFill>
-                <a:latin typeface="Source Sans Pro Black"/>
+              <a:rPr b="0" lang="en-PH" sz="1800" spc="-1" strike="noStrike">
+                <a:latin typeface="Arial"/>
               </a:rPr>
               <a:t>Click to edit the outline text format</a:t>
             </a:r>
-            <a:endParaRPr b="1" lang="en-US" sz="2200" spc="-1" strike="noStrike">
-              <a:solidFill>
-                <a:srgbClr val="000000"/>
-              </a:solidFill>
-              <a:latin typeface="Source Sans Pro Black"/>
+            <a:endParaRPr b="0" lang="en-PH" sz="1800" spc="-1" strike="noStrike">
+              <a:latin typeface="Arial"/>
             </a:endParaRPr>
           </a:p>
           <a:p>
             <a:pPr lvl="1" marL="864000" indent="-324000">
-              <a:spcAft>
+              <a:spcBef>
                 <a:spcPts val="1134"/>
-              </a:spcAft>
+              </a:spcBef>
               <a:buClr>
                 <a:srgbClr val="000000"/>
               </a:buClr>
@@ -3305,26 +3083,20 @@
               <a:buChar char=""/>
             </a:pPr>
             <a:r>
-              <a:rPr b="1" lang="en-US" sz="1800" spc="-1" strike="noStrike">
-                <a:solidFill>
-                  <a:srgbClr val="000000"/>
-                </a:solidFill>
-                <a:latin typeface="Impact"/>
+              <a:rPr b="0" lang="en-PH" sz="1800" spc="-1" strike="noStrike">
+                <a:latin typeface="Arial"/>
               </a:rPr>
               <a:t>Second Outline Level</a:t>
             </a:r>
-            <a:endParaRPr b="1" lang="en-US" sz="1800" spc="-1" strike="noStrike">
-              <a:solidFill>
-                <a:srgbClr val="000000"/>
-              </a:solidFill>
-              <a:latin typeface="Impact"/>
+            <a:endParaRPr b="0" lang="en-PH" sz="1800" spc="-1" strike="noStrike">
+              <a:latin typeface="Arial"/>
             </a:endParaRPr>
           </a:p>
           <a:p>
             <a:pPr lvl="2" marL="1296000" indent="-288000">
-              <a:spcAft>
+              <a:spcBef>
                 <a:spcPts val="850"/>
-              </a:spcAft>
+              </a:spcBef>
               <a:buClr>
                 <a:srgbClr val="000000"/>
               </a:buClr>
@@ -3333,26 +3105,20 @@
               <a:buChar char=""/>
             </a:pPr>
             <a:r>
-              <a:rPr b="1" lang="en-US" sz="1800" spc="-1" strike="noStrike">
-                <a:solidFill>
-                  <a:srgbClr val="000000"/>
-                </a:solidFill>
-                <a:latin typeface="Impact"/>
+              <a:rPr b="0" lang="en-PH" sz="1800" spc="-1" strike="noStrike">
+                <a:latin typeface="Arial"/>
               </a:rPr>
               <a:t>Third Outline Level</a:t>
             </a:r>
-            <a:endParaRPr b="1" lang="en-US" sz="1800" spc="-1" strike="noStrike">
-              <a:solidFill>
-                <a:srgbClr val="000000"/>
-              </a:solidFill>
-              <a:latin typeface="Impact"/>
+            <a:endParaRPr b="0" lang="en-PH" sz="1800" spc="-1" strike="noStrike">
+              <a:latin typeface="Arial"/>
             </a:endParaRPr>
           </a:p>
           <a:p>
             <a:pPr lvl="3" marL="1728000" indent="-216000">
-              <a:spcAft>
+              <a:spcBef>
                 <a:spcPts val="567"/>
-              </a:spcAft>
+              </a:spcBef>
               <a:buClr>
                 <a:srgbClr val="000000"/>
               </a:buClr>
@@ -3361,26 +3127,20 @@
               <a:buChar char=""/>
             </a:pPr>
             <a:r>
-              <a:rPr b="1" lang="en-US" sz="1800" spc="-1" strike="noStrike">
-                <a:solidFill>
-                  <a:srgbClr val="000000"/>
-                </a:solidFill>
-                <a:latin typeface="Impact"/>
+              <a:rPr b="0" lang="en-PH" sz="1800" spc="-1" strike="noStrike">
+                <a:latin typeface="Arial"/>
               </a:rPr>
               <a:t>Fourth Outline Level</a:t>
             </a:r>
-            <a:endParaRPr b="1" lang="en-US" sz="1800" spc="-1" strike="noStrike">
-              <a:solidFill>
-                <a:srgbClr val="000000"/>
-              </a:solidFill>
-              <a:latin typeface="Impact"/>
+            <a:endParaRPr b="0" lang="en-PH" sz="1800" spc="-1" strike="noStrike">
+              <a:latin typeface="Arial"/>
             </a:endParaRPr>
           </a:p>
           <a:p>
             <a:pPr lvl="4" marL="2160000" indent="-216000">
-              <a:spcAft>
+              <a:spcBef>
                 <a:spcPts val="283"/>
-              </a:spcAft>
+              </a:spcBef>
               <a:buClr>
                 <a:srgbClr val="000000"/>
               </a:buClr>
@@ -3389,26 +3149,20 @@
               <a:buChar char=""/>
             </a:pPr>
             <a:r>
-              <a:rPr b="1" lang="en-US" sz="1800" spc="-1" strike="noStrike">
-                <a:solidFill>
-                  <a:srgbClr val="000000"/>
-                </a:solidFill>
-                <a:latin typeface="Impact"/>
+              <a:rPr b="0" lang="en-PH" sz="1800" spc="-1" strike="noStrike">
+                <a:latin typeface="Arial"/>
               </a:rPr>
               <a:t>Fifth Outline Level</a:t>
             </a:r>
-            <a:endParaRPr b="1" lang="en-US" sz="1800" spc="-1" strike="noStrike">
-              <a:solidFill>
-                <a:srgbClr val="000000"/>
-              </a:solidFill>
-              <a:latin typeface="Impact"/>
+            <a:endParaRPr b="0" lang="en-PH" sz="1800" spc="-1" strike="noStrike">
+              <a:latin typeface="Arial"/>
             </a:endParaRPr>
           </a:p>
           <a:p>
             <a:pPr lvl="5" marL="2592000" indent="-216000">
-              <a:spcAft>
+              <a:spcBef>
                 <a:spcPts val="283"/>
-              </a:spcAft>
+              </a:spcBef>
               <a:buClr>
                 <a:srgbClr val="000000"/>
               </a:buClr>
@@ -3417,26 +3171,20 @@
               <a:buChar char=""/>
             </a:pPr>
             <a:r>
-              <a:rPr b="1" lang="en-US" sz="1800" spc="-1" strike="noStrike">
-                <a:solidFill>
-                  <a:srgbClr val="000000"/>
-                </a:solidFill>
-                <a:latin typeface="Impact"/>
+              <a:rPr b="0" lang="en-PH" sz="1800" spc="-1" strike="noStrike">
+                <a:latin typeface="Arial"/>
               </a:rPr>
               <a:t>Sixth Outline Level</a:t>
             </a:r>
-            <a:endParaRPr b="1" lang="en-US" sz="1800" spc="-1" strike="noStrike">
-              <a:solidFill>
-                <a:srgbClr val="000000"/>
-              </a:solidFill>
-              <a:latin typeface="Impact"/>
+            <a:endParaRPr b="0" lang="en-PH" sz="1800" spc="-1" strike="noStrike">
+              <a:latin typeface="Arial"/>
             </a:endParaRPr>
           </a:p>
           <a:p>
             <a:pPr lvl="6" marL="3024000" indent="-216000">
-              <a:spcAft>
+              <a:spcBef>
                 <a:spcPts val="283"/>
-              </a:spcAft>
+              </a:spcBef>
               <a:buClr>
                 <a:srgbClr val="000000"/>
               </a:buClr>
@@ -3445,141 +3193,13 @@
               <a:buChar char=""/>
             </a:pPr>
             <a:r>
-              <a:rPr b="1" lang="en-US" sz="1800" spc="-1" strike="noStrike">
-                <a:solidFill>
-                  <a:srgbClr val="000000"/>
-                </a:solidFill>
-                <a:latin typeface="Impact"/>
+              <a:rPr b="0" lang="en-PH" sz="1800" spc="-1" strike="noStrike">
+                <a:latin typeface="Arial"/>
               </a:rPr>
               <a:t>Seventh Outline Level</a:t>
             </a:r>
-            <a:endParaRPr b="1" lang="en-US" sz="1800" spc="-1" strike="noStrike">
-              <a:solidFill>
-                <a:srgbClr val="000000"/>
-              </a:solidFill>
-              <a:latin typeface="Impact"/>
-            </a:endParaRPr>
-          </a:p>
-        </p:txBody>
-      </p:sp>
-      <p:sp>
-        <p:nvSpPr>
-          <p:cNvPr id="45" name="PlaceHolder 3"/>
-          <p:cNvSpPr>
-            <a:spLocks noGrp="1"/>
-          </p:cNvSpPr>
-          <p:nvPr>
-            <p:ph type="dt"/>
-          </p:nvPr>
-        </p:nvSpPr>
-        <p:spPr>
-          <a:xfrm>
-            <a:off x="288360" y="6995160"/>
-            <a:ext cx="1677600" cy="521280"/>
-          </a:xfrm>
-          <a:prstGeom prst="rect">
-            <a:avLst/>
-          </a:prstGeom>
-        </p:spPr>
-        <p:txBody>
-          <a:bodyPr lIns="0" rIns="0" tIns="0" bIns="0"/>
-          <a:p>
-            <a:r>
-              <a:rPr b="0" lang="en-US" sz="1400" spc="-1" strike="noStrike">
-                <a:solidFill>
-                  <a:srgbClr val="ffffff"/>
-                </a:solidFill>
-                <a:latin typeface="Century Gothic"/>
-              </a:rPr>
-              <a:t>&lt;date/time&gt;</a:t>
-            </a:r>
-            <a:endParaRPr b="0" lang="en-US" sz="1400" spc="-1" strike="noStrike">
-              <a:solidFill>
-                <a:srgbClr val="ffffff"/>
-              </a:solidFill>
-              <a:latin typeface="Century Gothic"/>
-            </a:endParaRPr>
-          </a:p>
-        </p:txBody>
-      </p:sp>
-      <p:sp>
-        <p:nvSpPr>
-          <p:cNvPr id="46" name="PlaceHolder 4"/>
-          <p:cNvSpPr>
-            <a:spLocks noGrp="1"/>
-          </p:cNvSpPr>
-          <p:nvPr>
-            <p:ph type="ftr"/>
-          </p:nvPr>
-        </p:nvSpPr>
-        <p:spPr>
-          <a:xfrm>
-            <a:off x="3947760" y="6995160"/>
-            <a:ext cx="2023200" cy="521280"/>
-          </a:xfrm>
-          <a:prstGeom prst="rect">
-            <a:avLst/>
-          </a:prstGeom>
-        </p:spPr>
-        <p:txBody>
-          <a:bodyPr lIns="0" rIns="0" tIns="0" bIns="0"/>
-          <a:p>
-            <a:pPr algn="ctr"/>
-            <a:r>
-              <a:rPr b="0" lang="en-US" sz="1400" spc="-1" strike="noStrike">
-                <a:solidFill>
-                  <a:srgbClr val="ffffff"/>
-                </a:solidFill>
-                <a:latin typeface="Century Gothic"/>
-              </a:rPr>
-              <a:t>&lt;footer&gt;</a:t>
-            </a:r>
-            <a:endParaRPr b="0" lang="en-US" sz="1400" spc="-1" strike="noStrike">
-              <a:solidFill>
-                <a:srgbClr val="ffffff"/>
-              </a:solidFill>
-              <a:latin typeface="Century Gothic"/>
-            </a:endParaRPr>
-          </a:p>
-        </p:txBody>
-      </p:sp>
-      <p:sp>
-        <p:nvSpPr>
-          <p:cNvPr id="47" name="PlaceHolder 5"/>
-          <p:cNvSpPr>
-            <a:spLocks noGrp="1"/>
-          </p:cNvSpPr>
-          <p:nvPr>
-            <p:ph type="sldNum"/>
-          </p:nvPr>
-        </p:nvSpPr>
-        <p:spPr>
-          <a:xfrm>
-            <a:off x="7952760" y="6995160"/>
-            <a:ext cx="1803240" cy="521280"/>
-          </a:xfrm>
-          <a:prstGeom prst="rect">
-            <a:avLst/>
-          </a:prstGeom>
-        </p:spPr>
-        <p:txBody>
-          <a:bodyPr lIns="0" rIns="0" tIns="0" bIns="0"/>
-          <a:p>
-            <a:pPr algn="r"/>
-            <a:fld id="{2764BED5-0E88-422C-9458-673012EE8300}" type="slidenum">
-              <a:rPr b="0" lang="en-US" sz="1400" spc="-1" strike="noStrike">
-                <a:solidFill>
-                  <a:srgbClr val="ffffff"/>
-                </a:solidFill>
-                <a:latin typeface="Century Gothic"/>
-              </a:rPr>
-              <a:t>&lt;number&gt;</a:t>
-            </a:fld>
-            <a:endParaRPr b="0" lang="en-US" sz="1400" spc="-1" strike="noStrike">
-              <a:solidFill>
-                <a:srgbClr val="ffffff"/>
-              </a:solidFill>
-              <a:latin typeface="Century Gothic"/>
+            <a:endParaRPr b="0" lang="en-PH" sz="1800" spc="-1" strike="noStrike">
+              <a:latin typeface="Arial"/>
             </a:endParaRPr>
           </a:p>
         </p:txBody>
@@ -3623,14 +3243,14 @@
       </p:grpSpPr>
       <p:sp>
         <p:nvSpPr>
-          <p:cNvPr id="84" name="TextShape 1"/>
-          <p:cNvSpPr txBox="1"/>
+          <p:cNvPr id="78" name="CustomShape 1"/>
+          <p:cNvSpPr/>
           <p:nvPr/>
         </p:nvSpPr>
         <p:spPr>
           <a:xfrm>
             <a:off x="3886200" y="5715000"/>
-            <a:ext cx="6400800" cy="1762200"/>
+            <a:ext cx="6400440" cy="1761840"/>
           </a:xfrm>
           <a:prstGeom prst="rect">
             <a:avLst/>
@@ -3640,11 +3260,22 @@
             <a:noFill/>
           </a:ln>
         </p:spPr>
+        <p:style>
+          <a:lnRef idx="0"/>
+          <a:fillRef idx="0"/>
+          <a:effectRef idx="0"/>
+          <a:fontRef idx="minor"/>
+        </p:style>
         <p:txBody>
           <a:bodyPr lIns="0" rIns="0" tIns="0" bIns="0" anchor="ctr"/>
           <a:p>
+            <a:pPr>
+              <a:lnSpc>
+                <a:spcPct val="100000"/>
+              </a:lnSpc>
+            </a:pPr>
             <a:r>
-              <a:rPr b="1" lang="en-US" sz="4400" spc="-1" strike="noStrike">
+              <a:rPr b="1" lang="en-PH" sz="4400" spc="-1" strike="noStrike">
                 <a:solidFill>
                   <a:srgbClr val="ffffff"/>
                 </a:solidFill>
@@ -3652,17 +3283,41 @@
               </a:rPr>
               <a:t>Applying Textures</a:t>
             </a:r>
-            <a:endParaRPr b="1" lang="en-US" sz="4400" spc="-1" strike="noStrike">
-              <a:solidFill>
-                <a:srgbClr val="ffffff"/>
-              </a:solidFill>
-              <a:latin typeface="Source Sans Pro Black"/>
+            <a:endParaRPr b="0" lang="en-PH" sz="4400" spc="-1" strike="noStrike">
+              <a:latin typeface="Arial"/>
             </a:endParaRPr>
           </a:p>
         </p:txBody>
       </p:sp>
     </p:spTree>
   </p:cSld>
+  <p:timing>
+    <p:tnLst>
+      <p:par>
+        <p:cTn id="1" dur="indefinite" restart="never" nodeType="tmRoot">
+          <p:childTnLst>
+            <p:seq>
+              <p:cTn id="2" dur="indefinite" nodeType="mainSeq"/>
+              <p:prevCondLst>
+                <p:cond delay="0" evt="onPrev">
+                  <p:tgtEl>
+                    <p:sldTgt/>
+                  </p:tgtEl>
+                </p:cond>
+              </p:prevCondLst>
+              <p:nextCondLst>
+                <p:cond delay="0" evt="onNext">
+                  <p:tgtEl>
+                    <p:sldTgt/>
+                  </p:tgtEl>
+                </p:cond>
+              </p:nextCondLst>
+            </p:seq>
+          </p:childTnLst>
+        </p:cTn>
+      </p:par>
+    </p:tnLst>
+  </p:timing>
 </p:sld>
 </file>
 
@@ -3685,14 +3340,14 @@
       </p:grpSpPr>
       <p:sp>
         <p:nvSpPr>
-          <p:cNvPr id="85" name="TextShape 1"/>
-          <p:cNvSpPr txBox="1"/>
+          <p:cNvPr id="79" name="CustomShape 1"/>
+          <p:cNvSpPr/>
           <p:nvPr/>
         </p:nvSpPr>
         <p:spPr>
           <a:xfrm>
             <a:off x="504000" y="850320"/>
-            <a:ext cx="9071640" cy="1172160"/>
+            <a:ext cx="9071280" cy="1171800"/>
           </a:xfrm>
           <a:prstGeom prst="rect">
             <a:avLst/>
@@ -3702,11 +3357,22 @@
             <a:noFill/>
           </a:ln>
         </p:spPr>
+        <p:style>
+          <a:lnRef idx="0"/>
+          <a:fillRef idx="0"/>
+          <a:effectRef idx="0"/>
+          <a:fontRef idx="minor"/>
+        </p:style>
         <p:txBody>
           <a:bodyPr lIns="0" rIns="0" tIns="0" bIns="0" anchor="ctr"/>
           <a:p>
+            <a:pPr>
+              <a:lnSpc>
+                <a:spcPct val="100000"/>
+              </a:lnSpc>
+            </a:pPr>
             <a:r>
-              <a:rPr b="1" lang="en-US" sz="3200" spc="-1" strike="noStrike">
+              <a:rPr b="1" lang="en-PH" sz="3200" spc="-1" strike="noStrike">
                 <a:solidFill>
                   <a:srgbClr val="000000"/>
                 </a:solidFill>
@@ -3714,25 +3380,22 @@
               </a:rPr>
               <a:t>06 Laboratory Exercise 1</a:t>
             </a:r>
-            <a:endParaRPr b="1" lang="en-US" sz="3200" spc="-1" strike="noStrike">
-              <a:solidFill>
-                <a:srgbClr val="000000"/>
-              </a:solidFill>
-              <a:latin typeface="Source Sans Pro Black"/>
-            </a:endParaRPr>
-          </a:p>
-        </p:txBody>
-      </p:sp>
-      <p:sp>
-        <p:nvSpPr>
-          <p:cNvPr id="86" name="TextShape 2"/>
-          <p:cNvSpPr txBox="1"/>
+            <a:endParaRPr b="0" lang="en-PH" sz="3200" spc="-1" strike="noStrike">
+              <a:latin typeface="Arial"/>
+            </a:endParaRPr>
+          </a:p>
+        </p:txBody>
+      </p:sp>
+      <p:sp>
+        <p:nvSpPr>
+          <p:cNvPr id="80" name="CustomShape 2"/>
+          <p:cNvSpPr/>
           <p:nvPr/>
         </p:nvSpPr>
         <p:spPr>
           <a:xfrm>
             <a:off x="504000" y="2273040"/>
-            <a:ext cx="9071640" cy="4030200"/>
+            <a:ext cx="9071280" cy="4029840"/>
           </a:xfrm>
           <a:prstGeom prst="rect">
             <a:avLst/>
@@ -3742,10 +3405,19 @@
             <a:noFill/>
           </a:ln>
         </p:spPr>
+        <p:style>
+          <a:lnRef idx="0"/>
+          <a:fillRef idx="0"/>
+          <a:effectRef idx="0"/>
+          <a:fontRef idx="minor"/>
+        </p:style>
         <p:txBody>
           <a:bodyPr lIns="0" rIns="0" tIns="0" bIns="0"/>
           <a:p>
-            <a:pPr marL="432000" indent="-324000">
+            <a:pPr marL="432000" indent="-323640">
+              <a:lnSpc>
+                <a:spcPct val="100000"/>
+              </a:lnSpc>
               <a:spcAft>
                 <a:spcPts val="1417"/>
               </a:spcAft>
@@ -3757,7 +3429,7 @@
               <a:buChar char=""/>
             </a:pPr>
             <a:r>
-              <a:rPr b="1" lang="en-US" sz="3600" spc="-1" strike="noStrike">
+              <a:rPr b="1" lang="en-PH" sz="3600" spc="-1" strike="noStrike">
                 <a:solidFill>
                   <a:srgbClr val="000000"/>
                 </a:solidFill>
@@ -3765,15 +3437,15 @@
               </a:rPr>
               <a:t>Objectives</a:t>
             </a:r>
-            <a:endParaRPr b="1" lang="en-US" sz="3600" spc="-1" strike="noStrike">
-              <a:solidFill>
-                <a:srgbClr val="000000"/>
-              </a:solidFill>
-              <a:latin typeface="Source Sans Pro Black"/>
-            </a:endParaRPr>
-          </a:p>
-          <a:p>
-            <a:pPr marL="432000" indent="-324000">
+            <a:endParaRPr b="0" lang="en-PH" sz="3600" spc="-1" strike="noStrike">
+              <a:latin typeface="Arial"/>
+            </a:endParaRPr>
+          </a:p>
+          <a:p>
+            <a:pPr marL="432000" indent="-323640">
+              <a:lnSpc>
+                <a:spcPct val="100000"/>
+              </a:lnSpc>
               <a:spcAft>
                 <a:spcPts val="1417"/>
               </a:spcAft>
@@ -3785,7 +3457,7 @@
               <a:buChar char=""/>
             </a:pPr>
             <a:r>
-              <a:rPr b="1" lang="en-US" sz="2200" spc="-1" strike="noStrike">
+              <a:rPr b="1" lang="en-PH" sz="2200" spc="-1" strike="noStrike">
                 <a:solidFill>
                   <a:srgbClr val="000000"/>
                 </a:solidFill>
@@ -3793,15 +3465,15 @@
               </a:rPr>
               <a:t>At the end of laboratory exercise the students should be able to:</a:t>
             </a:r>
-            <a:endParaRPr b="1" lang="en-US" sz="2200" spc="-1" strike="noStrike">
-              <a:solidFill>
-                <a:srgbClr val="000000"/>
-              </a:solidFill>
-              <a:latin typeface="Source Sans Pro Black"/>
-            </a:endParaRPr>
-          </a:p>
-          <a:p>
-            <a:pPr marL="432000" indent="-324000">
+            <a:endParaRPr b="0" lang="en-PH" sz="2200" spc="-1" strike="noStrike">
+              <a:latin typeface="Arial"/>
+            </a:endParaRPr>
+          </a:p>
+          <a:p>
+            <a:pPr marL="432000" indent="-323640">
+              <a:lnSpc>
+                <a:spcPct val="100000"/>
+              </a:lnSpc>
               <a:spcAft>
                 <a:spcPts val="1417"/>
               </a:spcAft>
@@ -3813,7 +3485,7 @@
               <a:buChar char=""/>
             </a:pPr>
             <a:r>
-              <a:rPr b="1" lang="en-US" sz="2200" spc="-1" strike="noStrike">
+              <a:rPr b="1" lang="en-PH" sz="2200" spc="-1" strike="noStrike">
                 <a:solidFill>
                   <a:srgbClr val="000000"/>
                 </a:solidFill>
@@ -3821,15 +3493,15 @@
               </a:rPr>
               <a:t>Draw a square using GL_TRIANGLES</a:t>
             </a:r>
-            <a:endParaRPr b="1" lang="en-US" sz="2200" spc="-1" strike="noStrike">
-              <a:solidFill>
-                <a:srgbClr val="000000"/>
-              </a:solidFill>
-              <a:latin typeface="Source Sans Pro Black"/>
-            </a:endParaRPr>
-          </a:p>
-          <a:p>
-            <a:pPr marL="432000" indent="-324000">
+            <a:endParaRPr b="0" lang="en-PH" sz="2200" spc="-1" strike="noStrike">
+              <a:latin typeface="Arial"/>
+            </a:endParaRPr>
+          </a:p>
+          <a:p>
+            <a:pPr marL="432000" indent="-323640">
+              <a:lnSpc>
+                <a:spcPct val="100000"/>
+              </a:lnSpc>
               <a:spcAft>
                 <a:spcPts val="1417"/>
               </a:spcAft>
@@ -3841,7 +3513,7 @@
               <a:buChar char=""/>
             </a:pPr>
             <a:r>
-              <a:rPr b="1" lang="en-US" sz="2200" spc="-1" strike="noStrike">
+              <a:rPr b="1" lang="en-PH" sz="2200" spc="-1" strike="noStrike">
                 <a:solidFill>
                   <a:srgbClr val="000000"/>
                 </a:solidFill>
@@ -3849,15 +3521,15 @@
               </a:rPr>
               <a:t>Duplicate objects using glPushMatrix and glPopMatrix statements. </a:t>
             </a:r>
-            <a:endParaRPr b="1" lang="en-US" sz="2200" spc="-1" strike="noStrike">
-              <a:solidFill>
-                <a:srgbClr val="000000"/>
-              </a:solidFill>
-              <a:latin typeface="Source Sans Pro Black"/>
-            </a:endParaRPr>
-          </a:p>
-          <a:p>
-            <a:pPr marL="432000" indent="-324000">
+            <a:endParaRPr b="0" lang="en-PH" sz="2200" spc="-1" strike="noStrike">
+              <a:latin typeface="Arial"/>
+            </a:endParaRPr>
+          </a:p>
+          <a:p>
+            <a:pPr marL="432000" indent="-323640">
+              <a:lnSpc>
+                <a:spcPct val="100000"/>
+              </a:lnSpc>
               <a:spcAft>
                 <a:spcPts val="1417"/>
               </a:spcAft>
@@ -3869,7 +3541,7 @@
               <a:buChar char=""/>
             </a:pPr>
             <a:r>
-              <a:rPr b="1" lang="en-US" sz="2200" spc="-1" strike="noStrike">
+              <a:rPr b="1" lang="en-PH" sz="2200" spc="-1" strike="noStrike">
                 <a:solidFill>
                   <a:srgbClr val="000000"/>
                 </a:solidFill>
@@ -3877,15 +3549,15 @@
               </a:rPr>
               <a:t>Create a cube using glRotatef from the duplicated objects.</a:t>
             </a:r>
-            <a:endParaRPr b="1" lang="en-US" sz="2200" spc="-1" strike="noStrike">
-              <a:solidFill>
-                <a:srgbClr val="000000"/>
-              </a:solidFill>
-              <a:latin typeface="Source Sans Pro Black"/>
-            </a:endParaRPr>
-          </a:p>
-          <a:p>
-            <a:pPr marL="432000" indent="-324000">
+            <a:endParaRPr b="0" lang="en-PH" sz="2200" spc="-1" strike="noStrike">
+              <a:latin typeface="Arial"/>
+            </a:endParaRPr>
+          </a:p>
+          <a:p>
+            <a:pPr marL="432000" indent="-323640">
+              <a:lnSpc>
+                <a:spcPct val="100000"/>
+              </a:lnSpc>
               <a:spcAft>
                 <a:spcPts val="1417"/>
               </a:spcAft>
@@ -3897,7 +3569,7 @@
               <a:buChar char=""/>
             </a:pPr>
             <a:r>
-              <a:rPr b="1" lang="en-US" sz="2200" spc="-1" strike="noStrike">
+              <a:rPr b="1" lang="en-PH" sz="2200" spc="-1" strike="noStrike">
                 <a:solidFill>
                   <a:srgbClr val="000000"/>
                 </a:solidFill>
@@ -3905,17 +3577,41 @@
               </a:rPr>
               <a:t>Apply texture to the cube object.</a:t>
             </a:r>
-            <a:endParaRPr b="1" lang="en-US" sz="2200" spc="-1" strike="noStrike">
-              <a:solidFill>
-                <a:srgbClr val="000000"/>
-              </a:solidFill>
-              <a:latin typeface="Source Sans Pro Black"/>
+            <a:endParaRPr b="0" lang="en-PH" sz="2200" spc="-1" strike="noStrike">
+              <a:latin typeface="Arial"/>
             </a:endParaRPr>
           </a:p>
         </p:txBody>
       </p:sp>
     </p:spTree>
   </p:cSld>
+  <p:timing>
+    <p:tnLst>
+      <p:par>
+        <p:cTn id="3" dur="indefinite" restart="never" nodeType="tmRoot">
+          <p:childTnLst>
+            <p:seq>
+              <p:cTn id="4" dur="indefinite" nodeType="mainSeq"/>
+              <p:prevCondLst>
+                <p:cond delay="0" evt="onPrev">
+                  <p:tgtEl>
+                    <p:sldTgt/>
+                  </p:tgtEl>
+                </p:cond>
+              </p:prevCondLst>
+              <p:nextCondLst>
+                <p:cond delay="0" evt="onNext">
+                  <p:tgtEl>
+                    <p:sldTgt/>
+                  </p:tgtEl>
+                </p:cond>
+              </p:nextCondLst>
+            </p:seq>
+          </p:childTnLst>
+        </p:cTn>
+      </p:par>
+    </p:tnLst>
+  </p:timing>
 </p:sld>
 </file>
 
@@ -3936,9 +3632,44 @@
           <a:chExt cx="0" cy="0"/>
         </a:xfrm>
       </p:grpSpPr>
+      <p:sp>
+        <p:nvSpPr>
+          <p:cNvPr id="81" name="TextShape 1"/>
+          <p:cNvSpPr txBox="1"/>
+          <p:nvPr/>
+        </p:nvSpPr>
+        <p:spPr>
+          <a:xfrm>
+            <a:off x="504720" y="288000"/>
+            <a:ext cx="9071280" cy="1261800"/>
+          </a:xfrm>
+          <a:prstGeom prst="rect">
+            <a:avLst/>
+          </a:prstGeom>
+          <a:noFill/>
+          <a:ln>
+            <a:noFill/>
+          </a:ln>
+        </p:spPr>
+        <p:txBody>
+          <a:bodyPr lIns="0" rIns="0" tIns="0" bIns="0" anchor="ctr"/>
+          <a:p>
+            <a:pPr algn="ctr"/>
+            <a:r>
+              <a:rPr b="0" lang="en-PH" sz="4400" spc="-1" strike="noStrike">
+                <a:latin typeface="Arial"/>
+              </a:rPr>
+              <a:t>Plotting the Points</a:t>
+            </a:r>
+            <a:endParaRPr b="0" lang="en-PH" sz="4400" spc="-1" strike="noStrike">
+              <a:latin typeface="Arial"/>
+            </a:endParaRPr>
+          </a:p>
+        </p:txBody>
+      </p:sp>
       <p:pic>
         <p:nvPicPr>
-          <p:cNvPr id="87" name="" descr=""/>
+          <p:cNvPr id="82" name="" descr=""/>
           <p:cNvPicPr/>
           <p:nvPr/>
         </p:nvPicPr>
@@ -3948,8 +3679,195 @@
         </p:blipFill>
         <p:spPr>
           <a:xfrm>
+            <a:off x="2806920" y="1364400"/>
+            <a:ext cx="4681080" cy="4294440"/>
+          </a:xfrm>
+          <a:prstGeom prst="rect">
+            <a:avLst/>
+          </a:prstGeom>
+          <a:ln>
+            <a:noFill/>
+          </a:ln>
+        </p:spPr>
+      </p:pic>
+      <p:sp>
+        <p:nvSpPr>
+          <p:cNvPr id="83" name="TextShape 2"/>
+          <p:cNvSpPr txBox="1"/>
+          <p:nvPr/>
+        </p:nvSpPr>
+        <p:spPr>
+          <a:xfrm>
+            <a:off x="2880000" y="5976000"/>
+            <a:ext cx="4536000" cy="858240"/>
+          </a:xfrm>
+          <a:prstGeom prst="rect">
+            <a:avLst/>
+          </a:prstGeom>
+          <a:noFill/>
+          <a:ln>
+            <a:noFill/>
+          </a:ln>
+        </p:spPr>
+        <p:txBody>
+          <a:bodyPr lIns="90000" rIns="90000" tIns="45000" bIns="45000"/>
+          <a:p>
+            <a:r>
+              <a:rPr b="0" lang="en-PH" sz="1800" spc="-1" strike="noStrike">
+                <a:latin typeface="Arial"/>
+                <a:ea typeface="Noto Sans CJK SC"/>
+              </a:rPr>
+              <a:t>A = (1,1,1)</a:t>
+            </a:r>
+            <a:r>
+              <a:rPr b="0" lang="en-PH" sz="1800" spc="-1" strike="noStrike">
+                <a:latin typeface="Arial"/>
+                <a:ea typeface="Noto Sans CJK SC"/>
+              </a:rPr>
+              <a:t>	</a:t>
+            </a:r>
+            <a:r>
+              <a:rPr b="0" lang="en-PH" sz="1800" spc="-1" strike="noStrike">
+                <a:latin typeface="Arial"/>
+                <a:ea typeface="Noto Sans CJK SC"/>
+              </a:rPr>
+              <a:t>	</a:t>
+            </a:r>
+            <a:r>
+              <a:rPr b="0" lang="en-PH" sz="1800" spc="-1" strike="noStrike">
+                <a:latin typeface="Arial"/>
+                <a:ea typeface="Noto Sans CJK SC"/>
+              </a:rPr>
+              <a:t>	</a:t>
+            </a:r>
+            <a:r>
+              <a:rPr b="0" lang="en-PH" sz="1800" spc="-1" strike="noStrike">
+                <a:latin typeface="Arial"/>
+                <a:ea typeface="Noto Sans CJK SC"/>
+              </a:rPr>
+              <a:t>	</a:t>
+            </a:r>
+            <a:r>
+              <a:rPr b="0" lang="en-PH" sz="1800" spc="-1" strike="noStrike">
+                <a:latin typeface="Arial"/>
+              </a:rPr>
+              <a:t>C = (-1,-1,1)</a:t>
+            </a:r>
+            <a:endParaRPr b="0" lang="en-PH" sz="1800" spc="-1" strike="noStrike">
+              <a:latin typeface="Arial"/>
+            </a:endParaRPr>
+          </a:p>
+          <a:p>
+            <a:r>
+              <a:rPr b="0" lang="en-PH" sz="1800" spc="-1" strike="noStrike">
+                <a:latin typeface="Arial"/>
+              </a:rPr>
+              <a:t>B = (-1,1,1)</a:t>
+            </a:r>
+            <a:r>
+              <a:rPr b="0" lang="en-PH" sz="1800" spc="-1" strike="noStrike">
+                <a:latin typeface="Arial"/>
+              </a:rPr>
+              <a:t>	</a:t>
+            </a:r>
+            <a:r>
+              <a:rPr b="0" lang="en-PH" sz="1800" spc="-1" strike="noStrike">
+                <a:latin typeface="Arial"/>
+              </a:rPr>
+              <a:t>	</a:t>
+            </a:r>
+            <a:r>
+              <a:rPr b="0" lang="en-PH" sz="1800" spc="-1" strike="noStrike">
+                <a:latin typeface="Arial"/>
+              </a:rPr>
+              <a:t>	</a:t>
+            </a:r>
+            <a:r>
+              <a:rPr b="0" lang="en-PH" sz="1800" spc="-1" strike="noStrike">
+                <a:latin typeface="Arial"/>
+              </a:rPr>
+              <a:t>	</a:t>
+            </a:r>
+            <a:r>
+              <a:rPr b="0" lang="en-PH" sz="1800" spc="-1" strike="noStrike">
+                <a:latin typeface="Arial"/>
+              </a:rPr>
+              <a:t>D = (1,-1,1)</a:t>
+            </a:r>
+            <a:endParaRPr b="0" lang="en-PH" sz="1800" spc="-1" strike="noStrike">
+              <a:latin typeface="Arial"/>
+            </a:endParaRPr>
+          </a:p>
+          <a:p>
+            <a:endParaRPr b="0" lang="en-PH" sz="1800" spc="-1" strike="noStrike">
+              <a:latin typeface="Arial"/>
+            </a:endParaRPr>
+          </a:p>
+        </p:txBody>
+      </p:sp>
+    </p:spTree>
+  </p:cSld>
+  <p:timing>
+    <p:tnLst>
+      <p:par>
+        <p:cTn id="5" dur="indefinite" restart="never" nodeType="tmRoot">
+          <p:childTnLst>
+            <p:seq>
+              <p:cTn id="6" dur="indefinite" nodeType="mainSeq"/>
+              <p:prevCondLst>
+                <p:cond delay="0" evt="onPrev">
+                  <p:tgtEl>
+                    <p:sldTgt/>
+                  </p:tgtEl>
+                </p:cond>
+              </p:prevCondLst>
+              <p:nextCondLst>
+                <p:cond delay="0" evt="onNext">
+                  <p:tgtEl>
+                    <p:sldTgt/>
+                  </p:tgtEl>
+                </p:cond>
+              </p:nextCondLst>
+            </p:seq>
+          </p:childTnLst>
+        </p:cTn>
+      </p:par>
+    </p:tnLst>
+  </p:timing>
+</p:sld>
+</file>
+
+<file path=ppt/slides/slide4.xml><?xml version="1.0" encoding="utf-8"?>
+<p:sld xmlns:a="http://schemas.openxmlformats.org/drawingml/2006/main" xmlns:p="http://schemas.openxmlformats.org/presentationml/2006/main" xmlns:r="http://schemas.openxmlformats.org/officeDocument/2006/relationships" xmlns:p14="http://schemas.microsoft.com/office/powerpoint/2010/main" xmlns:p15="http://schemas.microsoft.com/office/powerpoint/2012/main" xmlns:mc="http://schemas.openxmlformats.org/markup-compatibility/2006">
+  <p:cSld>
+    <p:spTree>
+      <p:nvGrpSpPr>
+        <p:cNvPr id="1" name=""/>
+        <p:cNvGrpSpPr/>
+        <p:nvPr/>
+      </p:nvGrpSpPr>
+      <p:grpSpPr>
+        <a:xfrm>
+          <a:off x="0" y="0"/>
+          <a:ext cx="0" cy="0"/>
+          <a:chOff x="0" y="0"/>
+          <a:chExt cx="0" cy="0"/>
+        </a:xfrm>
+      </p:grpSpPr>
+      <p:pic>
+        <p:nvPicPr>
+          <p:cNvPr id="84" name="" descr=""/>
+          <p:cNvPicPr/>
+          <p:nvPr/>
+        </p:nvPicPr>
+        <p:blipFill>
+          <a:blip r:embed="rId1"/>
+          <a:stretch/>
+        </p:blipFill>
+        <p:spPr>
+          <a:xfrm>
             <a:off x="1600200" y="867240"/>
-            <a:ext cx="7086600" cy="5533560"/>
+            <a:ext cx="7086240" cy="5533200"/>
           </a:xfrm>
           <a:prstGeom prst="rect">
             <a:avLst/>
@@ -3961,6 +3879,33 @@
       </p:pic>
     </p:spTree>
   </p:cSld>
+  <p:timing>
+    <p:tnLst>
+      <p:par>
+        <p:cTn id="7" dur="indefinite" restart="never" nodeType="tmRoot">
+          <p:childTnLst>
+            <p:seq>
+              <p:cTn id="8" dur="indefinite" nodeType="mainSeq"/>
+              <p:prevCondLst>
+                <p:cond delay="0" evt="onPrev">
+                  <p:tgtEl>
+                    <p:sldTgt/>
+                  </p:tgtEl>
+                </p:cond>
+              </p:prevCondLst>
+              <p:nextCondLst>
+                <p:cond delay="0" evt="onNext">
+                  <p:tgtEl>
+                    <p:sldTgt/>
+                  </p:tgtEl>
+                </p:cond>
+              </p:nextCondLst>
+            </p:seq>
+          </p:childTnLst>
+        </p:cTn>
+      </p:par>
+    </p:tnLst>
+  </p:timing>
 </p:sld>
 </file>
 

</xml_diff>